<commit_message>
some corrections to manual slides recompiled JAR
</commit_message>
<xml_diff>
--- a/manual (drafts)/Sunset_Slides_UniKlu.pptx
+++ b/manual (drafts)/Sunset_Slides_UniKlu.pptx
@@ -1389,7 +1389,7 @@
             </a:pPr>
             <a:r>
               <a:rPr lang="de-DE" sz="1100" dirty="0" smtClean="0"/>
-              <a:t>31.08.2017 </a:t>
+              <a:t>07.03.2020 </a:t>
             </a:r>
             <a:r>
               <a:rPr lang="de-DE" sz="1100" dirty="0" smtClean="0"/>
@@ -1888,7 +1888,7 @@
             </a:pPr>
             <a:r>
               <a:rPr lang="en-GB" dirty="0" smtClean="0"/>
-              <a:t>31.08.2017 </a:t>
+              <a:t>07.03.2020 </a:t>
             </a:r>
             <a:r>
               <a:rPr lang="en-GB" dirty="0" smtClean="0"/>
@@ -2396,7 +2396,7 @@
             </a:pPr>
             <a:r>
               <a:rPr lang="de-DE" sz="1100" dirty="0" smtClean="0"/>
-              <a:t>31.08.2017 </a:t>
+              <a:t>07.03.2020 </a:t>
             </a:r>
             <a:r>
               <a:rPr lang="de-DE" sz="1100" dirty="0" smtClean="0"/>
@@ -3413,7 +3413,7 @@
             </a:pPr>
             <a:r>
               <a:rPr lang="en-GB" dirty="0" smtClean="0"/>
-              <a:t>31.08.2017 </a:t>
+              <a:t>07.03.2020 </a:t>
             </a:r>
             <a:r>
               <a:rPr lang="en-GB" dirty="0" smtClean="0"/>
@@ -5002,7 +5002,7 @@
           <a:p>
             <a:r>
               <a:rPr lang="en-US" dirty="0" smtClean="0"/>
-              <a:t>Console-Output</a:t>
+              <a:t>Console-I/O</a:t>
             </a:r>
             <a:endParaRPr lang="en-US" dirty="0"/>
           </a:p>
@@ -5192,23 +5192,56 @@
           <a:p>
             <a:r>
               <a:rPr lang="en-US" dirty="0" smtClean="0">
-                <a:solidFill>
-                  <a:schemeClr val="bg1">
-                    <a:lumMod val="50000"/>
-                  </a:schemeClr>
-                </a:solidFill>
                 <a:latin typeface="+mj-lt"/>
                 <a:cs typeface="Courier New" panose="02070309020205020404" pitchFamily="49" charset="0"/>
               </a:rPr>
-              <a:t>Reading values from the console (user-input) is subject of ongoing development (will be a feature in future versions)</a:t>
-            </a:r>
-            <a:r>
-              <a:rPr lang="en-US" dirty="0" smtClean="0"/>
-              <a:t/>
-            </a:r>
-            <a:br>
-              <a:rPr lang="en-US" dirty="0" smtClean="0"/>
-            </a:br>
+              <a:t>Reading values from the console (user-input) is possible by the functions </a:t>
+            </a:r>
+            <a:r>
+              <a:rPr lang="en-US" b="1" i="1" dirty="0" err="1" smtClean="0">
+                <a:latin typeface="Courier New" panose="02070309020205020404" pitchFamily="49" charset="0"/>
+                <a:cs typeface="Courier New" panose="02070309020205020404" pitchFamily="49" charset="0"/>
+              </a:rPr>
+              <a:t>readInt</a:t>
+            </a:r>
+            <a:r>
+              <a:rPr lang="en-US" dirty="0" smtClean="0">
+                <a:latin typeface="+mj-lt"/>
+                <a:cs typeface="Courier New" panose="02070309020205020404" pitchFamily="49" charset="0"/>
+              </a:rPr>
+              <a:t>, </a:t>
+            </a:r>
+            <a:r>
+              <a:rPr lang="en-US" b="1" i="1" dirty="0" err="1">
+                <a:latin typeface="Courier New" panose="02070309020205020404" pitchFamily="49" charset="0"/>
+                <a:cs typeface="Courier New" panose="02070309020205020404" pitchFamily="49" charset="0"/>
+              </a:rPr>
+              <a:t>readGF</a:t>
+            </a:r>
+            <a:r>
+              <a:rPr lang="en-US" dirty="0" smtClean="0">
+                <a:latin typeface="+mj-lt"/>
+                <a:cs typeface="Courier New" panose="02070309020205020404" pitchFamily="49" charset="0"/>
+              </a:rPr>
+              <a:t>, …, all of which take one parameter of type </a:t>
+            </a:r>
+            <a:r>
+              <a:rPr lang="en-US" b="1" dirty="0">
+                <a:solidFill>
+                  <a:srgbClr val="7030A0"/>
+                </a:solidFill>
+                <a:latin typeface="Courier New" panose="02070309020205020404" pitchFamily="49" charset="0"/>
+                <a:cs typeface="Courier New" panose="02070309020205020404" pitchFamily="49" charset="0"/>
+              </a:rPr>
+              <a:t>String</a:t>
+            </a:r>
+            <a:r>
+              <a:rPr lang="en-US" dirty="0" smtClean="0">
+                <a:latin typeface="+mj-lt"/>
+                <a:cs typeface="Courier New" panose="02070309020205020404" pitchFamily="49" charset="0"/>
+              </a:rPr>
+              <a:t> to prompt the user.</a:t>
+            </a:r>
             <a:endParaRPr lang="en-US" dirty="0" smtClean="0"/>
           </a:p>
         </p:txBody>
@@ -9799,7 +9832,7 @@
           <a:graphicData uri="http://schemas.openxmlformats.org/presentationml/2006/ole">
             <mc:AlternateContent xmlns:mc="http://schemas.openxmlformats.org/markup-compatibility/2006">
               <mc:Choice xmlns:v="urn:schemas-microsoft-com:vml" Requires="v">
-                <p:oleObj spid="_x0000_s2123" name="Visio" r:id="rId3" imgW="4276641" imgH="2038259" progId="Visio.Drawing.15">
+                <p:oleObj spid="_x0000_s2128" name="Visio" r:id="rId3" imgW="4276641" imgH="2038259" progId="Visio.Drawing.15">
                   <p:embed/>
                 </p:oleObj>
               </mc:Choice>
@@ -10200,23 +10233,7 @@
                   <a:schemeClr val="bg2"/>
                 </a:solidFill>
               </a:rPr>
-              <a:t>Institute of Applied Informatics </a:t>
-            </a:r>
-            <a:r>
-              <a:rPr lang="en-US" sz="1400" dirty="0" smtClean="0">
-                <a:solidFill>
-                  <a:schemeClr val="bg2"/>
-                </a:solidFill>
-              </a:rPr>
-              <a:t>– </a:t>
-            </a:r>
-            <a:r>
-              <a:rPr lang="en-US" sz="1400" dirty="0" smtClean="0">
-                <a:solidFill>
-                  <a:schemeClr val="bg2"/>
-                </a:solidFill>
-              </a:rPr>
-              <a:t>System </a:t>
+              <a:t>Institute of Applied Informatics – System </a:t>
             </a:r>
             <a:endParaRPr lang="en-US" sz="1400" dirty="0">
               <a:solidFill>
@@ -11026,7 +11043,7 @@
           <a:graphicData uri="http://schemas.openxmlformats.org/presentationml/2006/ole">
             <mc:AlternateContent xmlns:mc="http://schemas.openxmlformats.org/markup-compatibility/2006">
               <mc:Choice xmlns:v="urn:schemas-microsoft-com:vml" Requires="v">
-                <p:oleObj spid="_x0000_s3136" name="Formel" r:id="rId3" imgW="6832600" imgH="749300" progId="Equation.3">
+                <p:oleObj spid="_x0000_s3141" name="Formel" r:id="rId3" imgW="6832600" imgH="749300" progId="Equation.3">
                   <p:embed/>
                 </p:oleObj>
               </mc:Choice>
@@ -12113,7 +12130,7 @@
           <a:graphicData uri="http://schemas.openxmlformats.org/presentationml/2006/ole">
             <mc:AlternateContent xmlns:mc="http://schemas.openxmlformats.org/markup-compatibility/2006">
               <mc:Choice xmlns:v="urn:schemas-microsoft-com:vml" Requires="v">
-                <p:oleObj spid="_x0000_s4159" name="Visio" r:id="rId3" imgW="3202054" imgH="945155" progId="Visio.Drawing.11">
+                <p:oleObj spid="_x0000_s4164" name="Visio" r:id="rId3" imgW="3202054" imgH="945155" progId="Visio.Drawing.11">
                   <p:embed/>
                 </p:oleObj>
               </mc:Choice>
@@ -17814,11 +17831,11 @@
                   <a:srgbClr val="0000FF"/>
                 </a:solidFill>
               </a:rPr>
-              <a:t>local v</a:t>
+              <a:t>local</a:t>
             </a:r>
             <a:r>
               <a:rPr lang="en-US" dirty="0" smtClean="0"/>
-              <a:t>ariables.</a:t>
+              <a:t> variables.</a:t>
             </a:r>
           </a:p>
           <a:p>
@@ -19336,12 +19353,6 @@
             </a:r>
           </a:p>
           <a:p>
-            <a:r>
-              <a:rPr lang="en-US" dirty="0" smtClean="0"/>
-              <a:t>Calls by reference and calls by value</a:t>
-            </a:r>
-          </a:p>
-          <a:p>
             <a:pPr marL="92075" indent="0">
               <a:buNone/>
             </a:pPr>
@@ -19351,7 +19362,15 @@
                   <a:srgbClr val="0000FF"/>
                 </a:solidFill>
               </a:rPr>
-              <a:t>Examples:</a:t>
+              <a:t>Examples</a:t>
+            </a:r>
+            <a:r>
+              <a:rPr lang="en-US" u="sng" dirty="0" smtClean="0">
+                <a:solidFill>
+                  <a:srgbClr val="0000FF"/>
+                </a:solidFill>
+              </a:rPr>
+              <a:t>:</a:t>
             </a:r>
           </a:p>
           <a:p>

</xml_diff>

<commit_message>
fixed issue with random points on elliptic curves over fields of characteristic 2 fixed issue with the execution of "break" statements (credits for both fixes go to Max-Julian Jakobitsch)
</commit_message>
<xml_diff>
--- a/manual (drafts)/Sunset_Slides_UniKlu.pptx
+++ b/manual (drafts)/Sunset_Slides_UniKlu.pptx
@@ -11047,7 +11047,7 @@
           <a:graphicData uri="http://schemas.openxmlformats.org/presentationml/2006/ole">
             <mc:AlternateContent xmlns:mc="http://schemas.openxmlformats.org/markup-compatibility/2006">
               <mc:Choice xmlns:v="urn:schemas-microsoft-com:vml" Requires="v">
-                <p:oleObj spid="_x0000_s2178" name="Visio" r:id="rId3" imgW="4276641" imgH="2038259" progId="Visio.Drawing.15">
+                <p:oleObj spid="_x0000_s2179" name="Visio" r:id="rId3" imgW="4276641" imgH="2038259" progId="Visio.Drawing.15">
                   <p:embed/>
                 </p:oleObj>
               </mc:Choice>
@@ -13933,7 +13933,7 @@
           <a:graphicData uri="http://schemas.openxmlformats.org/presentationml/2006/ole">
             <mc:AlternateContent xmlns:mc="http://schemas.openxmlformats.org/markup-compatibility/2006">
               <mc:Choice xmlns:v="urn:schemas-microsoft-com:vml" Requires="v">
-                <p:oleObj spid="_x0000_s3191" name="Formel" r:id="rId3" imgW="6832600" imgH="749300" progId="Equation.3">
+                <p:oleObj spid="_x0000_s3192" name="Formel" r:id="rId3" imgW="6832600" imgH="749300" progId="Equation.3">
                   <p:embed/>
                 </p:oleObj>
               </mc:Choice>
@@ -14964,7 +14964,7 @@
           <a:graphicData uri="http://schemas.openxmlformats.org/presentationml/2006/ole">
             <mc:AlternateContent xmlns:mc="http://schemas.openxmlformats.org/markup-compatibility/2006">
               <mc:Choice xmlns:v="urn:schemas-microsoft-com:vml" Requires="v">
-                <p:oleObj spid="_x0000_s4214" name="Visio" r:id="rId3" imgW="3202054" imgH="945155" progId="Visio.Drawing.11">
+                <p:oleObj spid="_x0000_s4215" name="Visio" r:id="rId3" imgW="3202054" imgH="945155" progId="Visio.Drawing.11">
                   <p:embed/>
                 </p:oleObj>
               </mc:Choice>
@@ -27361,7 +27361,7 @@
           </a:p>
           <a:p>
             <a:r>
-              <a:rPr lang="de-AT" smtClean="0"/>
+              <a:rPr lang="de-AT" dirty="0" err="1" smtClean="0"/>
               <a:t>Elliptic</a:t>
             </a:r>
             <a:r>

</xml_diff>

<commit_message>
small updates to the manuals (after having had bugfixes)
</commit_message>
<xml_diff>
--- a/manual (drafts)/Sunset_Slides_UniKlu.pptx
+++ b/manual (drafts)/Sunset_Slides_UniKlu.pptx
@@ -11047,7 +11047,7 @@
           <a:graphicData uri="http://schemas.openxmlformats.org/presentationml/2006/ole">
             <mc:AlternateContent xmlns:mc="http://schemas.openxmlformats.org/markup-compatibility/2006">
               <mc:Choice xmlns:v="urn:schemas-microsoft-com:vml" Requires="v">
-                <p:oleObj spid="_x0000_s2179" name="Visio" r:id="rId3" imgW="4276641" imgH="2038259" progId="Visio.Drawing.15">
+                <p:oleObj spid="_x0000_s2187" name="Visio" r:id="rId3" imgW="4276641" imgH="2038259" progId="Visio.Drawing.15">
                   <p:embed/>
                 </p:oleObj>
               </mc:Choice>
@@ -13933,7 +13933,7 @@
           <a:graphicData uri="http://schemas.openxmlformats.org/presentationml/2006/ole">
             <mc:AlternateContent xmlns:mc="http://schemas.openxmlformats.org/markup-compatibility/2006">
               <mc:Choice xmlns:v="urn:schemas-microsoft-com:vml" Requires="v">
-                <p:oleObj spid="_x0000_s3192" name="Formel" r:id="rId3" imgW="6832600" imgH="749300" progId="Equation.3">
+                <p:oleObj spid="_x0000_s3200" name="Formel" r:id="rId3" imgW="6832600" imgH="749300" progId="Equation.3">
                   <p:embed/>
                 </p:oleObj>
               </mc:Choice>
@@ -14964,7 +14964,7 @@
           <a:graphicData uri="http://schemas.openxmlformats.org/presentationml/2006/ole">
             <mc:AlternateContent xmlns:mc="http://schemas.openxmlformats.org/markup-compatibility/2006">
               <mc:Choice xmlns:v="urn:schemas-microsoft-com:vml" Requires="v">
-                <p:oleObj spid="_x0000_s4215" name="Visio" r:id="rId3" imgW="3202054" imgH="945155" progId="Visio.Drawing.11">
+                <p:oleObj spid="_x0000_s4223" name="Visio" r:id="rId3" imgW="3202054" imgH="945155" progId="Visio.Drawing.11">
                   <p:embed/>
                 </p:oleObj>
               </mc:Choice>
@@ -27140,11 +27140,7 @@
             </a:r>
             <a:r>
               <a:rPr lang="de-AT" dirty="0" smtClean="0"/>
-              <a:t> </a:t>
-            </a:r>
-            <a:r>
-              <a:rPr lang="de-AT" dirty="0" smtClean="0"/>
-              <a:t>(</a:t>
+              <a:t> (</a:t>
             </a:r>
             <a:r>
               <a:rPr lang="de-AT" dirty="0" err="1" smtClean="0"/>
@@ -27183,15 +27179,33 @@
           <a:p>
             <a:r>
               <a:rPr lang="de-AT" dirty="0" err="1" smtClean="0"/>
-              <a:t>the</a:t>
+              <a:t>Definitions</a:t>
             </a:r>
             <a:r>
               <a:rPr lang="de-AT" dirty="0" smtClean="0"/>
-              <a:t> break </a:t>
+              <a:t> of </a:t>
             </a:r>
             <a:r>
               <a:rPr lang="de-AT" dirty="0" err="1" smtClean="0"/>
-              <a:t>statement</a:t>
+              <a:t>arrays</a:t>
+            </a:r>
+            <a:r>
+              <a:rPr lang="de-AT" dirty="0" smtClean="0"/>
+              <a:t> of type </a:t>
+            </a:r>
+            <a:r>
+              <a:rPr lang="de-AT" sz="1800" b="1" dirty="0">
+                <a:solidFill>
+                  <a:srgbClr val="7030A0"/>
+                </a:solidFill>
+                <a:latin typeface="Courier" pitchFamily="49" charset="0"/>
+                <a:cs typeface="Courier New" panose="02070309020205020404" pitchFamily="49" charset="0"/>
+              </a:rPr>
+              <a:t>Z()[] </a:t>
+            </a:r>
+            <a:r>
+              <a:rPr lang="de-AT" dirty="0" err="1" smtClean="0"/>
+              <a:t>have</a:t>
             </a:r>
             <a:r>
               <a:rPr lang="de-AT" dirty="0" smtClean="0"/>
@@ -27199,7 +27213,7 @@
             </a:r>
             <a:r>
               <a:rPr lang="de-AT" dirty="0" err="1" smtClean="0"/>
-              <a:t>sometimes</a:t>
+              <a:t>parsing</a:t>
             </a:r>
             <a:r>
               <a:rPr lang="de-AT" dirty="0" smtClean="0"/>
@@ -27207,15 +27221,7 @@
             </a:r>
             <a:r>
               <a:rPr lang="de-AT" dirty="0" err="1" smtClean="0"/>
-              <a:t>does</a:t>
-            </a:r>
-            <a:r>
-              <a:rPr lang="de-AT" dirty="0" smtClean="0"/>
-              <a:t> not </a:t>
-            </a:r>
-            <a:r>
-              <a:rPr lang="de-AT" dirty="0" err="1" smtClean="0"/>
-              <a:t>properly</a:t>
+              <a:t>issues</a:t>
             </a:r>
             <a:r>
               <a:rPr lang="de-AT" dirty="0" smtClean="0"/>
@@ -27223,7 +27229,7 @@
             </a:r>
             <a:r>
               <a:rPr lang="de-AT" dirty="0" err="1" smtClean="0"/>
-              <a:t>exit</a:t>
+              <a:t>if</a:t>
             </a:r>
             <a:r>
               <a:rPr lang="de-AT" dirty="0" smtClean="0"/>
@@ -27239,15 +27245,15 @@
             </a:r>
             <a:r>
               <a:rPr lang="de-AT" dirty="0" err="1" smtClean="0"/>
-              <a:t>surrounding</a:t>
+              <a:t>number</a:t>
             </a:r>
             <a:r>
               <a:rPr lang="de-AT" dirty="0" smtClean="0"/>
-              <a:t> block in </a:t>
+              <a:t> of </a:t>
             </a:r>
             <a:r>
               <a:rPr lang="de-AT" dirty="0" err="1" smtClean="0"/>
-              <a:t>nested</a:t>
+              <a:t>elements</a:t>
             </a:r>
             <a:r>
               <a:rPr lang="de-AT" dirty="0" smtClean="0"/>
@@ -27255,109 +27261,555 @@
             </a:r>
             <a:r>
               <a:rPr lang="de-AT" dirty="0" err="1" smtClean="0"/>
-              <a:t>constructs</a:t>
-            </a:r>
-            <a:endParaRPr lang="de-AT" dirty="0" smtClean="0"/>
-          </a:p>
-          <a:p>
-            <a:pPr lvl="1"/>
-            <a:r>
-              <a:rPr lang="de-AT" sz="2000" dirty="0" smtClean="0"/>
-              <a:t>Workaround: </a:t>
-            </a:r>
-            <a:r>
-              <a:rPr lang="de-AT" sz="2000" dirty="0" err="1" smtClean="0"/>
-              <a:t>to</a:t>
-            </a:r>
-            <a:r>
-              <a:rPr lang="de-AT" sz="2000" dirty="0" smtClean="0"/>
+              <a:t>is</a:t>
+            </a:r>
+            <a:r>
+              <a:rPr lang="de-AT" dirty="0" smtClean="0"/>
+              <a:t> not a </a:t>
+            </a:r>
+            <a:r>
+              <a:rPr lang="de-AT" dirty="0" err="1" smtClean="0"/>
+              <a:t>numeric</a:t>
+            </a:r>
+            <a:r>
+              <a:rPr lang="de-AT" dirty="0" smtClean="0"/>
               <a:t> </a:t>
             </a:r>
             <a:r>
-              <a:rPr lang="de-AT" sz="2000" dirty="0" err="1" smtClean="0"/>
-              <a:t>exit</a:t>
-            </a:r>
-            <a:r>
-              <a:rPr lang="de-AT" sz="2000" dirty="0" smtClean="0"/>
+              <a:rPr lang="de-AT" dirty="0" err="1" smtClean="0"/>
+              <a:t>token</a:t>
+            </a:r>
+            <a:r>
+              <a:rPr lang="de-AT" dirty="0" smtClean="0"/>
+              <a:t>.</a:t>
+            </a:r>
+            <a:br>
+              <a:rPr lang="de-AT" dirty="0" smtClean="0"/>
+            </a:br>
+            <a:r>
+              <a:rPr lang="de-AT" u="sng" dirty="0" err="1" smtClean="0"/>
+              <a:t>Example</a:t>
+            </a:r>
+            <a:r>
+              <a:rPr lang="de-AT" dirty="0" smtClean="0"/>
+              <a:t>: </a:t>
+            </a:r>
+            <a:br>
+              <a:rPr lang="de-AT" dirty="0" smtClean="0"/>
+            </a:br>
+            <a:r>
+              <a:rPr lang="de-AT" sz="1800" b="1" dirty="0" err="1">
+                <a:solidFill>
+                  <a:srgbClr val="7030A0"/>
+                </a:solidFill>
+                <a:latin typeface="Courier" pitchFamily="49" charset="0"/>
+                <a:cs typeface="Courier New" panose="02070309020205020404" pitchFamily="49" charset="0"/>
+              </a:rPr>
+              <a:t>const</a:t>
+            </a:r>
+            <a:r>
+              <a:rPr lang="de-AT" sz="1800" dirty="0" smtClean="0">
+                <a:latin typeface="Courier" pitchFamily="49" charset="0"/>
+              </a:rPr>
+              <a:t> n: </a:t>
+            </a:r>
+            <a:r>
+              <a:rPr lang="de-AT" sz="1800" b="1" dirty="0">
+                <a:solidFill>
+                  <a:srgbClr val="7030A0"/>
+                </a:solidFill>
+                <a:latin typeface="Courier" pitchFamily="49" charset="0"/>
+                <a:cs typeface="Courier New" panose="02070309020205020404" pitchFamily="49" charset="0"/>
+              </a:rPr>
+              <a:t>Integer</a:t>
+            </a:r>
+            <a:r>
+              <a:rPr lang="de-AT" sz="1800" dirty="0" smtClean="0">
+                <a:latin typeface="Courier" pitchFamily="49" charset="0"/>
+              </a:rPr>
+              <a:t> := 10;</a:t>
+            </a:r>
+            <a:br>
+              <a:rPr lang="de-AT" sz="1800" dirty="0" smtClean="0">
+                <a:latin typeface="Courier" pitchFamily="49" charset="0"/>
+              </a:rPr>
+            </a:br>
+            <a:r>
+              <a:rPr lang="de-AT" sz="1800" dirty="0" smtClean="0">
+                <a:latin typeface="Courier" pitchFamily="49" charset="0"/>
+              </a:rPr>
+              <a:t>A: </a:t>
+            </a:r>
+            <a:r>
+              <a:rPr lang="de-AT" sz="1800" b="1" dirty="0">
+                <a:solidFill>
+                  <a:srgbClr val="7030A0"/>
+                </a:solidFill>
+                <a:latin typeface="Courier" pitchFamily="49" charset="0"/>
+                <a:cs typeface="Courier New" panose="02070309020205020404" pitchFamily="49" charset="0"/>
+              </a:rPr>
+              <a:t>Z</a:t>
+            </a:r>
+            <a:r>
+              <a:rPr lang="de-AT" sz="1800" dirty="0" smtClean="0">
+                <a:latin typeface="Courier" pitchFamily="49" charset="0"/>
+              </a:rPr>
+              <a:t>(13)[]; </a:t>
+            </a:r>
+            <a:r>
+              <a:rPr lang="de-AT" sz="1800" dirty="0">
+                <a:solidFill>
+                  <a:srgbClr val="339933"/>
+                </a:solidFill>
+                <a:latin typeface="Courier New" panose="02070309020205020404" pitchFamily="49" charset="0"/>
+                <a:cs typeface="Courier New" panose="02070309020205020404" pitchFamily="49" charset="0"/>
+              </a:rPr>
+              <a:t>// </a:t>
+            </a:r>
+            <a:r>
+              <a:rPr lang="de-AT" sz="1800" dirty="0" err="1">
+                <a:solidFill>
+                  <a:srgbClr val="339933"/>
+                </a:solidFill>
+                <a:latin typeface="Courier New" panose="02070309020205020404" pitchFamily="49" charset="0"/>
+                <a:cs typeface="Courier New" panose="02070309020205020404" pitchFamily="49" charset="0"/>
+              </a:rPr>
+              <a:t>array</a:t>
+            </a:r>
+            <a:r>
+              <a:rPr lang="de-AT" sz="1800" dirty="0">
+                <a:solidFill>
+                  <a:srgbClr val="339933"/>
+                </a:solidFill>
+                <a:latin typeface="Courier New" panose="02070309020205020404" pitchFamily="49" charset="0"/>
+                <a:cs typeface="Courier New" panose="02070309020205020404" pitchFamily="49" charset="0"/>
+              </a:rPr>
+              <a:t> </a:t>
+            </a:r>
+            <a:r>
+              <a:rPr lang="de-AT" sz="1800" dirty="0" err="1">
+                <a:solidFill>
+                  <a:srgbClr val="339933"/>
+                </a:solidFill>
+                <a:latin typeface="Courier New" panose="02070309020205020404" pitchFamily="49" charset="0"/>
+                <a:cs typeface="Courier New" panose="02070309020205020404" pitchFamily="49" charset="0"/>
+              </a:rPr>
+              <a:t>over</a:t>
+            </a:r>
+            <a:r>
+              <a:rPr lang="de-AT" sz="1800" dirty="0">
+                <a:solidFill>
+                  <a:srgbClr val="339933"/>
+                </a:solidFill>
+                <a:latin typeface="Courier New" panose="02070309020205020404" pitchFamily="49" charset="0"/>
+                <a:cs typeface="Courier New" panose="02070309020205020404" pitchFamily="49" charset="0"/>
+              </a:rPr>
               <a:t> a </a:t>
             </a:r>
             <a:r>
-              <a:rPr lang="de-AT" sz="2000" dirty="0" err="1" smtClean="0"/>
-              <a:t>loop</a:t>
-            </a:r>
-            <a:r>
-              <a:rPr lang="de-AT" sz="2000" dirty="0" smtClean="0"/>
-              <a:t>, </a:t>
-            </a:r>
-            <a:r>
-              <a:rPr lang="de-AT" sz="2000" dirty="0" err="1" smtClean="0"/>
-              <a:t>set</a:t>
-            </a:r>
-            <a:r>
-              <a:rPr lang="de-AT" sz="2000" dirty="0" smtClean="0"/>
+              <a:rPr lang="de-AT" sz="1800" dirty="0" err="1">
+                <a:solidFill>
+                  <a:srgbClr val="339933"/>
+                </a:solidFill>
+                <a:latin typeface="Courier New" panose="02070309020205020404" pitchFamily="49" charset="0"/>
+                <a:cs typeface="Courier New" panose="02070309020205020404" pitchFamily="49" charset="0"/>
+              </a:rPr>
+              <a:t>polynomial</a:t>
+            </a:r>
+            <a:r>
+              <a:rPr lang="de-AT" sz="1800" dirty="0">
+                <a:solidFill>
+                  <a:srgbClr val="339933"/>
+                </a:solidFill>
+                <a:latin typeface="Courier New" panose="02070309020205020404" pitchFamily="49" charset="0"/>
+                <a:cs typeface="Courier New" panose="02070309020205020404" pitchFamily="49" charset="0"/>
+              </a:rPr>
+              <a:t> ring</a:t>
+            </a:r>
+            <a:r>
+              <a:rPr lang="de-AT" sz="1800" dirty="0" smtClean="0">
+                <a:latin typeface="Courier" pitchFamily="49" charset="0"/>
+              </a:rPr>
+              <a:t/>
+            </a:r>
+            <a:br>
+              <a:rPr lang="de-AT" sz="1800" dirty="0" smtClean="0">
+                <a:latin typeface="Courier" pitchFamily="49" charset="0"/>
+              </a:rPr>
+            </a:br>
+            <a:r>
+              <a:rPr lang="de-AT" sz="1800" dirty="0">
+                <a:solidFill>
+                  <a:srgbClr val="339933"/>
+                </a:solidFill>
+                <a:latin typeface="Courier New" panose="02070309020205020404" pitchFamily="49" charset="0"/>
+                <a:cs typeface="Courier New" panose="02070309020205020404" pitchFamily="49" charset="0"/>
+              </a:rPr>
+              <a:t>// </a:t>
+            </a:r>
+            <a:r>
+              <a:rPr lang="de-AT" sz="1800" dirty="0" err="1">
+                <a:solidFill>
+                  <a:srgbClr val="339933"/>
+                </a:solidFill>
+                <a:latin typeface="Courier New" panose="02070309020205020404" pitchFamily="49" charset="0"/>
+                <a:cs typeface="Courier New" panose="02070309020205020404" pitchFamily="49" charset="0"/>
+              </a:rPr>
+              <a:t>Instantiation</a:t>
+            </a:r>
+            <a:r>
+              <a:rPr lang="de-AT" sz="1800" dirty="0">
+                <a:solidFill>
+                  <a:srgbClr val="339933"/>
+                </a:solidFill>
+                <a:latin typeface="Courier New" panose="02070309020205020404" pitchFamily="49" charset="0"/>
+                <a:cs typeface="Courier New" panose="02070309020205020404" pitchFamily="49" charset="0"/>
+              </a:rPr>
               <a:t> </a:t>
             </a:r>
             <a:r>
-              <a:rPr lang="de-AT" sz="2000" dirty="0" err="1" smtClean="0"/>
-              <a:t>the</a:t>
-            </a:r>
-            <a:r>
-              <a:rPr lang="de-AT" sz="2000" dirty="0" smtClean="0"/>
+              <a:rPr lang="de-AT" sz="1800" dirty="0" err="1">
+                <a:solidFill>
+                  <a:srgbClr val="339933"/>
+                </a:solidFill>
+                <a:latin typeface="Courier New" panose="02070309020205020404" pitchFamily="49" charset="0"/>
+                <a:cs typeface="Courier New" panose="02070309020205020404" pitchFamily="49" charset="0"/>
+              </a:rPr>
+              <a:t>with</a:t>
+            </a:r>
+            <a:r>
+              <a:rPr lang="de-AT" sz="1800" dirty="0">
+                <a:solidFill>
+                  <a:srgbClr val="339933"/>
+                </a:solidFill>
+                <a:latin typeface="Courier New" panose="02070309020205020404" pitchFamily="49" charset="0"/>
+                <a:cs typeface="Courier New" panose="02070309020205020404" pitchFamily="49" charset="0"/>
+              </a:rPr>
               <a:t> </a:t>
             </a:r>
             <a:r>
-              <a:rPr lang="de-AT" sz="2000" dirty="0" err="1" smtClean="0"/>
-              <a:t>local</a:t>
-            </a:r>
-            <a:r>
-              <a:rPr lang="de-AT" sz="2000" dirty="0" smtClean="0"/>
-              <a:t> variables so </a:t>
-            </a:r>
-            <a:r>
-              <a:rPr lang="de-AT" sz="2000" dirty="0" err="1" smtClean="0"/>
-              <a:t>that</a:t>
-            </a:r>
-            <a:r>
-              <a:rPr lang="de-AT" sz="2000" dirty="0" smtClean="0"/>
+              <a:rPr lang="de-AT" sz="1800" dirty="0" err="1" smtClean="0">
+                <a:solidFill>
+                  <a:srgbClr val="339933"/>
+                </a:solidFill>
+                <a:latin typeface="Courier New" panose="02070309020205020404" pitchFamily="49" charset="0"/>
+                <a:cs typeface="Courier New" panose="02070309020205020404" pitchFamily="49" charset="0"/>
+              </a:rPr>
+              <a:t>new</a:t>
+            </a:r>
+            <a:r>
+              <a:rPr lang="de-AT" sz="1800" dirty="0" smtClean="0">
+                <a:solidFill>
+                  <a:srgbClr val="339933"/>
+                </a:solidFill>
+                <a:latin typeface="Courier New" panose="02070309020205020404" pitchFamily="49" charset="0"/>
+                <a:cs typeface="Courier New" panose="02070309020205020404" pitchFamily="49" charset="0"/>
+              </a:rPr>
               <a:t> </a:t>
             </a:r>
             <a:r>
-              <a:rPr lang="de-AT" sz="2000" dirty="0" err="1" smtClean="0"/>
-              <a:t>the</a:t>
-            </a:r>
-            <a:r>
-              <a:rPr lang="de-AT" sz="2000" dirty="0" smtClean="0"/>
+              <a:rPr lang="de-AT" sz="1800" dirty="0" err="1" smtClean="0">
+                <a:solidFill>
+                  <a:srgbClr val="339933"/>
+                </a:solidFill>
+                <a:latin typeface="Courier New" panose="02070309020205020404" pitchFamily="49" charset="0"/>
+                <a:cs typeface="Courier New" panose="02070309020205020404" pitchFamily="49" charset="0"/>
+              </a:rPr>
+              <a:t>operator</a:t>
+            </a:r>
+            <a:r>
+              <a:rPr lang="de-AT" sz="1800" dirty="0">
+                <a:solidFill>
+                  <a:srgbClr val="339933"/>
+                </a:solidFill>
+                <a:latin typeface="Courier New" panose="02070309020205020404" pitchFamily="49" charset="0"/>
+                <a:cs typeface="Courier New" panose="02070309020205020404" pitchFamily="49" charset="0"/>
+              </a:rPr>
+              <a:t/>
+            </a:r>
+            <a:br>
+              <a:rPr lang="de-AT" sz="1800" dirty="0">
+                <a:solidFill>
+                  <a:srgbClr val="339933"/>
+                </a:solidFill>
+                <a:latin typeface="Courier New" panose="02070309020205020404" pitchFamily="49" charset="0"/>
+                <a:cs typeface="Courier New" panose="02070309020205020404" pitchFamily="49" charset="0"/>
+              </a:rPr>
+            </a:br>
+            <a:r>
+              <a:rPr lang="de-AT" sz="1800" dirty="0" smtClean="0">
+                <a:latin typeface="Courier" pitchFamily="49" charset="0"/>
+              </a:rPr>
+              <a:t>A := </a:t>
+            </a:r>
+            <a:r>
+              <a:rPr lang="de-AT" sz="1800" b="1" dirty="0" err="1">
+                <a:solidFill>
+                  <a:srgbClr val="7030A0"/>
+                </a:solidFill>
+                <a:latin typeface="Courier" pitchFamily="49" charset="0"/>
+                <a:cs typeface="Courier New" panose="02070309020205020404" pitchFamily="49" charset="0"/>
+              </a:rPr>
+              <a:t>new</a:t>
+            </a:r>
+            <a:r>
+              <a:rPr lang="de-AT" sz="1800" dirty="0" smtClean="0">
+                <a:latin typeface="Courier" pitchFamily="49" charset="0"/>
+              </a:rPr>
               <a:t> </a:t>
             </a:r>
             <a:r>
-              <a:rPr lang="de-AT" sz="2000" dirty="0" err="1" smtClean="0"/>
-              <a:t>loop</a:t>
-            </a:r>
-            <a:r>
-              <a:rPr lang="de-AT" sz="2000" dirty="0" smtClean="0"/>
+              <a:rPr lang="de-AT" sz="1800" b="1" dirty="0">
+                <a:solidFill>
+                  <a:srgbClr val="7030A0"/>
+                </a:solidFill>
+                <a:latin typeface="Courier" pitchFamily="49" charset="0"/>
+                <a:cs typeface="Courier New" panose="02070309020205020404" pitchFamily="49" charset="0"/>
+              </a:rPr>
+              <a:t>Z</a:t>
+            </a:r>
+            <a:r>
+              <a:rPr lang="de-AT" sz="1800" dirty="0" smtClean="0">
+                <a:latin typeface="Courier" pitchFamily="49" charset="0"/>
+              </a:rPr>
+              <a:t>(13)[n]</a:t>
+            </a:r>
+            <a:r>
+              <a:rPr lang="de-AT" sz="1800" dirty="0" smtClean="0">
+                <a:latin typeface="Courier" pitchFamily="49" charset="0"/>
+              </a:rPr>
               <a:t> </a:t>
             </a:r>
             <a:r>
-              <a:rPr lang="de-AT" sz="2000" dirty="0" err="1" smtClean="0"/>
-              <a:t>termination</a:t>
-            </a:r>
-            <a:r>
-              <a:rPr lang="de-AT" sz="2000" dirty="0" smtClean="0"/>
+              <a:rPr lang="de-AT" sz="1800" dirty="0">
+                <a:solidFill>
+                  <a:srgbClr val="339933"/>
+                </a:solidFill>
+                <a:latin typeface="Courier New" panose="02070309020205020404" pitchFamily="49" charset="0"/>
+                <a:cs typeface="Courier New" panose="02070309020205020404" pitchFamily="49" charset="0"/>
+              </a:rPr>
+              <a:t>// </a:t>
+            </a:r>
+            <a:r>
+              <a:rPr lang="de-AT" sz="1800" dirty="0" err="1">
+                <a:solidFill>
+                  <a:srgbClr val="339933"/>
+                </a:solidFill>
+                <a:latin typeface="Courier New" panose="02070309020205020404" pitchFamily="49" charset="0"/>
+                <a:cs typeface="Courier New" panose="02070309020205020404" pitchFamily="49" charset="0"/>
+              </a:rPr>
+              <a:t>this</a:t>
+            </a:r>
+            <a:r>
+              <a:rPr lang="de-AT" sz="1800" dirty="0">
+                <a:solidFill>
+                  <a:srgbClr val="339933"/>
+                </a:solidFill>
+                <a:latin typeface="Courier New" panose="02070309020205020404" pitchFamily="49" charset="0"/>
+                <a:cs typeface="Courier New" panose="02070309020205020404" pitchFamily="49" charset="0"/>
+              </a:rPr>
+              <a:t> will not parse (BUG</a:t>
+            </a:r>
+            <a:r>
+              <a:rPr lang="de-AT" sz="1800" dirty="0" smtClean="0">
+                <a:solidFill>
+                  <a:srgbClr val="339933"/>
+                </a:solidFill>
+                <a:latin typeface="Courier New" panose="02070309020205020404" pitchFamily="49" charset="0"/>
+                <a:cs typeface="Courier New" panose="02070309020205020404" pitchFamily="49" charset="0"/>
+              </a:rPr>
+              <a:t>)</a:t>
+            </a:r>
+            <a:br>
+              <a:rPr lang="de-AT" sz="1800" dirty="0" smtClean="0">
+                <a:solidFill>
+                  <a:srgbClr val="339933"/>
+                </a:solidFill>
+                <a:latin typeface="Courier New" panose="02070309020205020404" pitchFamily="49" charset="0"/>
+                <a:cs typeface="Courier New" panose="02070309020205020404" pitchFamily="49" charset="0"/>
+              </a:rPr>
+            </a:br>
+            <a:r>
+              <a:rPr lang="de-AT" u="sng" dirty="0"/>
+              <a:t>Workaround</a:t>
+            </a:r>
+            <a:r>
+              <a:rPr lang="de-AT" dirty="0" smtClean="0"/>
+              <a:t>: </a:t>
+            </a:r>
+            <a:r>
+              <a:rPr lang="de-AT" dirty="0" err="1" smtClean="0"/>
+              <a:t>first</a:t>
+            </a:r>
+            <a:r>
+              <a:rPr lang="de-AT" dirty="0" smtClean="0"/>
               <a:t> </a:t>
             </a:r>
             <a:r>
-              <a:rPr lang="de-AT" sz="2000" dirty="0" err="1" smtClean="0"/>
-              <a:t>condition</a:t>
-            </a:r>
-            <a:r>
-              <a:rPr lang="de-AT" sz="2000" dirty="0" smtClean="0"/>
+              <a:rPr lang="de-AT" dirty="0" err="1" smtClean="0"/>
+              <a:t>token</a:t>
+            </a:r>
+            <a:r>
+              <a:rPr lang="de-AT" dirty="0" smtClean="0"/>
+              <a:t> must </a:t>
+            </a:r>
+            <a:r>
+              <a:rPr lang="de-AT" dirty="0" err="1" smtClean="0"/>
+              <a:t>be</a:t>
+            </a:r>
+            <a:r>
+              <a:rPr lang="de-AT" dirty="0" smtClean="0"/>
+              <a:t> a </a:t>
+            </a:r>
+            <a:r>
+              <a:rPr lang="de-AT" dirty="0" err="1" smtClean="0"/>
+              <a:t>number</a:t>
+            </a:r>
+            <a:r>
+              <a:rPr lang="de-AT" dirty="0" smtClean="0"/>
+              <a:t>; </a:t>
+            </a:r>
+            <a:r>
+              <a:rPr lang="de-AT" dirty="0" err="1" smtClean="0"/>
+              <a:t>add</a:t>
+            </a:r>
+            <a:r>
+              <a:rPr lang="de-AT" dirty="0" smtClean="0"/>
               <a:t> </a:t>
             </a:r>
             <a:r>
-              <a:rPr lang="de-AT" sz="2000" dirty="0" err="1" smtClean="0"/>
-              <a:t>fires</a:t>
-            </a:r>
-            <a:endParaRPr lang="de-AT" sz="2000" dirty="0" smtClean="0"/>
+              <a:rPr lang="de-AT" dirty="0" err="1" smtClean="0"/>
+              <a:t>zero</a:t>
+            </a:r>
+            <a:r>
+              <a:rPr lang="de-AT" dirty="0" smtClean="0"/>
+              <a:t>: </a:t>
+            </a:r>
+            <a:r>
+              <a:rPr lang="de-AT" sz="2000" dirty="0" smtClean="0">
+                <a:latin typeface="Courier" pitchFamily="49" charset="0"/>
+              </a:rPr>
+              <a:t>0+…</a:t>
+            </a:r>
+            <a:r>
+              <a:rPr lang="de-AT" sz="1800" dirty="0">
+                <a:solidFill>
+                  <a:srgbClr val="339933"/>
+                </a:solidFill>
+                <a:latin typeface="Courier New" panose="02070309020205020404" pitchFamily="49" charset="0"/>
+                <a:cs typeface="Courier New" panose="02070309020205020404" pitchFamily="49" charset="0"/>
+              </a:rPr>
+              <a:t/>
+            </a:r>
+            <a:br>
+              <a:rPr lang="de-AT" sz="1800" dirty="0">
+                <a:solidFill>
+                  <a:srgbClr val="339933"/>
+                </a:solidFill>
+                <a:latin typeface="Courier New" panose="02070309020205020404" pitchFamily="49" charset="0"/>
+                <a:cs typeface="Courier New" panose="02070309020205020404" pitchFamily="49" charset="0"/>
+              </a:rPr>
+            </a:br>
+            <a:r>
+              <a:rPr lang="de-AT" sz="1800" dirty="0">
+                <a:latin typeface="Courier" pitchFamily="49" charset="0"/>
+              </a:rPr>
+              <a:t>A := </a:t>
+            </a:r>
+            <a:r>
+              <a:rPr lang="de-AT" sz="1800" b="1" dirty="0" err="1">
+                <a:solidFill>
+                  <a:srgbClr val="7030A0"/>
+                </a:solidFill>
+                <a:latin typeface="Courier" pitchFamily="49" charset="0"/>
+                <a:cs typeface="Courier New" panose="02070309020205020404" pitchFamily="49" charset="0"/>
+              </a:rPr>
+              <a:t>new</a:t>
+            </a:r>
+            <a:r>
+              <a:rPr lang="de-AT" sz="1800" dirty="0">
+                <a:latin typeface="Courier" pitchFamily="49" charset="0"/>
+              </a:rPr>
+              <a:t> </a:t>
+            </a:r>
+            <a:r>
+              <a:rPr lang="de-AT" sz="1800" b="1" dirty="0">
+                <a:solidFill>
+                  <a:srgbClr val="7030A0"/>
+                </a:solidFill>
+                <a:latin typeface="Courier" pitchFamily="49" charset="0"/>
+                <a:cs typeface="Courier New" panose="02070309020205020404" pitchFamily="49" charset="0"/>
+              </a:rPr>
+              <a:t>Z</a:t>
+            </a:r>
+            <a:r>
+              <a:rPr lang="de-AT" sz="1800" dirty="0">
+                <a:latin typeface="Courier" pitchFamily="49" charset="0"/>
+              </a:rPr>
+              <a:t>(13</a:t>
+            </a:r>
+            <a:r>
+              <a:rPr lang="de-AT" sz="1800" dirty="0" smtClean="0">
+                <a:latin typeface="Courier" pitchFamily="49" charset="0"/>
+              </a:rPr>
+              <a:t>)[0+n</a:t>
+            </a:r>
+            <a:r>
+              <a:rPr lang="de-AT" sz="1800" dirty="0">
+                <a:latin typeface="Courier" pitchFamily="49" charset="0"/>
+              </a:rPr>
+              <a:t>] </a:t>
+            </a:r>
+            <a:r>
+              <a:rPr lang="de-AT" sz="1800" dirty="0">
+                <a:solidFill>
+                  <a:srgbClr val="339933"/>
+                </a:solidFill>
+                <a:latin typeface="Courier New" panose="02070309020205020404" pitchFamily="49" charset="0"/>
+                <a:cs typeface="Courier New" panose="02070309020205020404" pitchFamily="49" charset="0"/>
+              </a:rPr>
+              <a:t>// </a:t>
+            </a:r>
+            <a:r>
+              <a:rPr lang="de-AT" sz="1800" dirty="0" err="1">
+                <a:solidFill>
+                  <a:srgbClr val="339933"/>
+                </a:solidFill>
+                <a:latin typeface="Courier New" panose="02070309020205020404" pitchFamily="49" charset="0"/>
+                <a:cs typeface="Courier New" panose="02070309020205020404" pitchFamily="49" charset="0"/>
+              </a:rPr>
+              <a:t>this</a:t>
+            </a:r>
+            <a:r>
+              <a:rPr lang="de-AT" sz="1800" dirty="0">
+                <a:solidFill>
+                  <a:srgbClr val="339933"/>
+                </a:solidFill>
+                <a:latin typeface="Courier New" panose="02070309020205020404" pitchFamily="49" charset="0"/>
+                <a:cs typeface="Courier New" panose="02070309020205020404" pitchFamily="49" charset="0"/>
+              </a:rPr>
+              <a:t> will </a:t>
+            </a:r>
+            <a:r>
+              <a:rPr lang="de-AT" sz="1800" dirty="0" err="1" smtClean="0">
+                <a:solidFill>
+                  <a:srgbClr val="339933"/>
+                </a:solidFill>
+                <a:latin typeface="Courier New" panose="02070309020205020404" pitchFamily="49" charset="0"/>
+                <a:cs typeface="Courier New" panose="02070309020205020404" pitchFamily="49" charset="0"/>
+              </a:rPr>
+              <a:t>work</a:t>
+            </a:r>
+            <a:r>
+              <a:rPr lang="de-AT" sz="1800" dirty="0" smtClean="0">
+                <a:solidFill>
+                  <a:srgbClr val="339933"/>
+                </a:solidFill>
+                <a:latin typeface="Courier New" panose="02070309020205020404" pitchFamily="49" charset="0"/>
+                <a:cs typeface="Courier New" panose="02070309020205020404" pitchFamily="49" charset="0"/>
+              </a:rPr>
+              <a:t> (but not „[n+0]“!)</a:t>
+            </a:r>
           </a:p>
           <a:p>
             <a:r>
@@ -27460,216 +27912,213 @@
               <a:rPr lang="de-AT" dirty="0" err="1" smtClean="0"/>
               <a:t>settings</a:t>
             </a:r>
-            <a:endParaRPr lang="de-AT" dirty="0" smtClean="0"/>
-          </a:p>
-          <a:p>
-            <a:pPr lvl="1"/>
-            <a:r>
-              <a:rPr lang="de-AT" sz="2000" dirty="0" smtClean="0"/>
-              <a:t>Workaround: …</a:t>
-            </a:r>
-            <a:r>
-              <a:rPr lang="de-AT" sz="2000" dirty="0" err="1" smtClean="0"/>
+            <a:r>
+              <a:rPr lang="de-AT" dirty="0" smtClean="0"/>
+              <a:t/>
+            </a:r>
+            <a:br>
+              <a:rPr lang="de-AT" dirty="0" smtClean="0"/>
+            </a:br>
+            <a:r>
+              <a:rPr lang="de-AT" u="sng" dirty="0" smtClean="0"/>
+              <a:t>Workaround</a:t>
+            </a:r>
+            <a:r>
+              <a:rPr lang="de-AT" dirty="0" smtClean="0"/>
+              <a:t>: …</a:t>
+            </a:r>
+            <a:r>
+              <a:rPr lang="de-AT" dirty="0" err="1" smtClean="0"/>
               <a:t>unless</a:t>
             </a:r>
             <a:r>
-              <a:rPr lang="de-AT" sz="2000" dirty="0" smtClean="0"/>
+              <a:rPr lang="de-AT" dirty="0" smtClean="0"/>
               <a:t> </a:t>
             </a:r>
             <a:r>
-              <a:rPr lang="de-AT" sz="2000" dirty="0" err="1" smtClean="0"/>
+              <a:rPr lang="de-AT" dirty="0" err="1" smtClean="0"/>
               <a:t>you</a:t>
             </a:r>
             <a:r>
-              <a:rPr lang="de-AT" sz="2000" dirty="0" smtClean="0"/>
+              <a:rPr lang="de-AT" dirty="0" smtClean="0"/>
               <a:t> </a:t>
             </a:r>
             <a:r>
-              <a:rPr lang="de-AT" sz="2000" dirty="0" err="1" smtClean="0"/>
+              <a:rPr lang="de-AT" dirty="0" err="1" smtClean="0"/>
               <a:t>are</a:t>
             </a:r>
             <a:r>
-              <a:rPr lang="de-AT" sz="2000" dirty="0" smtClean="0"/>
+              <a:rPr lang="de-AT" dirty="0" smtClean="0"/>
               <a:t> </a:t>
             </a:r>
             <a:r>
-              <a:rPr lang="de-AT" sz="2000" dirty="0" err="1" smtClean="0"/>
+              <a:rPr lang="de-AT" dirty="0" err="1" smtClean="0"/>
               <a:t>willing</a:t>
             </a:r>
             <a:r>
-              <a:rPr lang="de-AT" sz="2000" dirty="0" smtClean="0"/>
+              <a:rPr lang="de-AT" dirty="0" smtClean="0"/>
               <a:t> </a:t>
             </a:r>
             <a:r>
-              <a:rPr lang="de-AT" sz="2000" dirty="0" err="1" smtClean="0"/>
+              <a:rPr lang="de-AT" dirty="0" err="1" smtClean="0"/>
               <a:t>to</a:t>
             </a:r>
             <a:r>
-              <a:rPr lang="de-AT" sz="2000" dirty="0" smtClean="0"/>
+              <a:rPr lang="de-AT" dirty="0" smtClean="0"/>
               <a:t> </a:t>
             </a:r>
             <a:r>
-              <a:rPr lang="de-AT" sz="2000" dirty="0" err="1" smtClean="0"/>
+              <a:rPr lang="de-AT" dirty="0" err="1" smtClean="0"/>
               <a:t>wait</a:t>
             </a:r>
             <a:r>
-              <a:rPr lang="de-AT" sz="2000" dirty="0" smtClean="0"/>
+              <a:rPr lang="de-AT" dirty="0" smtClean="0"/>
               <a:t> </a:t>
             </a:r>
             <a:r>
-              <a:rPr lang="de-AT" sz="2000" dirty="0" err="1" smtClean="0"/>
+              <a:rPr lang="de-AT" dirty="0" err="1" smtClean="0"/>
               <a:t>really</a:t>
             </a:r>
             <a:r>
-              <a:rPr lang="de-AT" sz="2000" dirty="0" smtClean="0"/>
+              <a:rPr lang="de-AT" dirty="0" smtClean="0"/>
               <a:t> </a:t>
             </a:r>
             <a:r>
-              <a:rPr lang="de-AT" sz="2000" dirty="0" err="1" smtClean="0"/>
+              <a:rPr lang="de-AT" dirty="0" err="1" smtClean="0"/>
               <a:t>long</a:t>
             </a:r>
             <a:r>
-              <a:rPr lang="de-AT" sz="2000" dirty="0" smtClean="0"/>
+              <a:rPr lang="de-AT" dirty="0" smtClean="0"/>
+              <a:t> for </a:t>
+            </a:r>
+            <a:r>
+              <a:rPr lang="de-AT" dirty="0" err="1" smtClean="0"/>
+              <a:t>the</a:t>
+            </a:r>
+            <a:r>
+              <a:rPr lang="de-AT" dirty="0" smtClean="0"/>
               <a:t> </a:t>
             </a:r>
             <a:r>
-              <a:rPr lang="de-AT" sz="2000" dirty="0" err="1" smtClean="0"/>
-              <a:t>for</a:t>
-            </a:r>
-            <a:r>
-              <a:rPr lang="de-AT" sz="2000" dirty="0" smtClean="0"/>
+              <a:rPr lang="de-AT" dirty="0" err="1" smtClean="0"/>
+              <a:t>arithmetic</a:t>
+            </a:r>
+            <a:r>
+              <a:rPr lang="de-AT" dirty="0" smtClean="0"/>
               <a:t> </a:t>
             </a:r>
             <a:r>
-              <a:rPr lang="de-AT" sz="2000" dirty="0" err="1" smtClean="0"/>
-              <a:t>the</a:t>
-            </a:r>
-            <a:r>
-              <a:rPr lang="de-AT" sz="2000" dirty="0" smtClean="0"/>
+              <a:rPr lang="de-AT" dirty="0" err="1" smtClean="0"/>
+              <a:t>to</a:t>
+            </a:r>
+            <a:r>
+              <a:rPr lang="de-AT" dirty="0" smtClean="0"/>
               <a:t> </a:t>
             </a:r>
             <a:r>
-              <a:rPr lang="de-AT" sz="2000" dirty="0" err="1" smtClean="0"/>
-              <a:t>arithmetic</a:t>
-            </a:r>
-            <a:r>
-              <a:rPr lang="de-AT" sz="2000" dirty="0" smtClean="0"/>
+              <a:rPr lang="de-AT" dirty="0" err="1" smtClean="0"/>
+              <a:t>complete</a:t>
+            </a:r>
+            <a:r>
+              <a:rPr lang="de-AT" dirty="0" smtClean="0"/>
+              <a:t>, </a:t>
+            </a:r>
+            <a:r>
+              <a:rPr lang="de-AT" dirty="0" err="1" smtClean="0"/>
+              <a:t>you</a:t>
+            </a:r>
+            <a:r>
+              <a:rPr lang="de-AT" dirty="0" smtClean="0"/>
               <a:t> </a:t>
             </a:r>
             <a:r>
-              <a:rPr lang="de-AT" sz="2000" dirty="0" err="1" smtClean="0"/>
-              <a:t>to</a:t>
-            </a:r>
-            <a:r>
-              <a:rPr lang="de-AT" sz="2000" dirty="0" smtClean="0"/>
+              <a:rPr lang="de-AT" dirty="0" err="1" smtClean="0"/>
+              <a:t>should</a:t>
+            </a:r>
+            <a:r>
+              <a:rPr lang="de-AT" dirty="0" smtClean="0"/>
+              <a:t> do </a:t>
+            </a:r>
+            <a:r>
+              <a:rPr lang="de-AT" dirty="0" err="1" smtClean="0"/>
+              <a:t>prototyping</a:t>
+            </a:r>
+            <a:r>
+              <a:rPr lang="de-AT" dirty="0" smtClean="0"/>
               <a:t> </a:t>
             </a:r>
             <a:r>
-              <a:rPr lang="de-AT" sz="2000" dirty="0" err="1" smtClean="0"/>
-              <a:t>complete</a:t>
-            </a:r>
-            <a:r>
-              <a:rPr lang="de-AT" sz="2000" dirty="0" smtClean="0"/>
-              <a:t>, </a:t>
-            </a:r>
-            <a:r>
-              <a:rPr lang="de-AT" sz="2000" dirty="0" err="1" smtClean="0"/>
-              <a:t>you</a:t>
-            </a:r>
-            <a:r>
-              <a:rPr lang="de-AT" sz="2000" dirty="0" smtClean="0"/>
+              <a:rPr lang="de-AT" dirty="0" err="1" smtClean="0"/>
+              <a:t>and</a:t>
+            </a:r>
+            <a:r>
+              <a:rPr lang="de-AT" dirty="0" smtClean="0"/>
               <a:t> </a:t>
             </a:r>
             <a:r>
-              <a:rPr lang="de-AT" sz="2000" dirty="0" err="1" smtClean="0"/>
-              <a:t>should</a:t>
-            </a:r>
-            <a:r>
-              <a:rPr lang="de-AT" sz="2000" dirty="0" smtClean="0"/>
-              <a:t> do </a:t>
-            </a:r>
-            <a:r>
-              <a:rPr lang="de-AT" sz="2000" dirty="0" err="1" smtClean="0"/>
-              <a:t>prototyping</a:t>
-            </a:r>
-            <a:r>
-              <a:rPr lang="de-AT" sz="2000" dirty="0" smtClean="0"/>
+              <a:rPr lang="de-AT" dirty="0" err="1" smtClean="0"/>
+              <a:t>demonstrations</a:t>
+            </a:r>
+            <a:r>
+              <a:rPr lang="de-AT" dirty="0" smtClean="0"/>
               <a:t> </a:t>
             </a:r>
             <a:r>
-              <a:rPr lang="de-AT" sz="2000" dirty="0" err="1" smtClean="0"/>
-              <a:t>and</a:t>
-            </a:r>
-            <a:r>
-              <a:rPr lang="de-AT" sz="2000" dirty="0" smtClean="0"/>
+              <a:rPr lang="de-AT" dirty="0" err="1" smtClean="0"/>
+              <a:t>with</a:t>
+            </a:r>
+            <a:r>
+              <a:rPr lang="de-AT" dirty="0" smtClean="0"/>
               <a:t> </a:t>
             </a:r>
             <a:r>
-              <a:rPr lang="de-AT" sz="2000" dirty="0" err="1" smtClean="0"/>
-              <a:t>demonstrations</a:t>
-            </a:r>
-            <a:r>
-              <a:rPr lang="de-AT" sz="2000" dirty="0" smtClean="0"/>
+              <a:rPr lang="de-AT" dirty="0" err="1" smtClean="0"/>
+              <a:t>small</a:t>
+            </a:r>
+            <a:r>
+              <a:rPr lang="de-AT" dirty="0" smtClean="0"/>
               <a:t> </a:t>
             </a:r>
             <a:r>
-              <a:rPr lang="de-AT" sz="2000" dirty="0" err="1" smtClean="0"/>
+              <a:rPr lang="de-AT" dirty="0" err="1" smtClean="0"/>
+              <a:t>paramters</a:t>
+            </a:r>
+            <a:r>
+              <a:rPr lang="de-AT" dirty="0" smtClean="0"/>
+              <a:t> </a:t>
+            </a:r>
+            <a:r>
+              <a:rPr lang="de-AT" dirty="0" err="1" smtClean="0"/>
               <a:t>with</a:t>
             </a:r>
             <a:r>
-              <a:rPr lang="de-AT" sz="2000" dirty="0" smtClean="0"/>
+              <a:rPr lang="de-AT" dirty="0" smtClean="0"/>
               <a:t> </a:t>
             </a:r>
             <a:r>
-              <a:rPr lang="de-AT" sz="2000" dirty="0" err="1" smtClean="0"/>
-              <a:t>small</a:t>
-            </a:r>
-            <a:r>
-              <a:rPr lang="de-AT" sz="2000" dirty="0" smtClean="0"/>
+              <a:rPr lang="de-AT" dirty="0" smtClean="0">
+                <a:sym typeface="Symbol" panose="05050102010706020507" pitchFamily="18" charset="2"/>
+              </a:rPr>
+              <a:t> 10 </a:t>
+            </a:r>
+            <a:r>
+              <a:rPr lang="de-AT" dirty="0" err="1" smtClean="0"/>
+              <a:t>bits</a:t>
+            </a:r>
+            <a:r>
+              <a:rPr lang="de-AT" dirty="0" smtClean="0"/>
               <a:t> </a:t>
             </a:r>
-            <a:r>
-              <a:rPr lang="de-AT" sz="2000" dirty="0" err="1" smtClean="0"/>
-              <a:t>paramters</a:t>
-            </a:r>
-            <a:r>
-              <a:rPr lang="de-AT" sz="2000" dirty="0" smtClean="0"/>
-              <a:t> </a:t>
-            </a:r>
-            <a:r>
-              <a:rPr lang="de-AT" sz="2000" dirty="0" err="1" smtClean="0"/>
-              <a:t>with</a:t>
-            </a:r>
-            <a:r>
-              <a:rPr lang="de-AT" sz="2000" dirty="0" smtClean="0"/>
-              <a:t> </a:t>
-            </a:r>
-            <a:r>
-              <a:rPr lang="de-AT" sz="2000" dirty="0" smtClean="0">
-                <a:sym typeface="Symbol" panose="05050102010706020507" pitchFamily="18" charset="2"/>
-              </a:rPr>
-              <a:t> 10 </a:t>
-            </a:r>
-            <a:r>
-              <a:rPr lang="de-AT" sz="2000" dirty="0" err="1" smtClean="0"/>
-              <a:t>bits</a:t>
-            </a:r>
-            <a:r>
-              <a:rPr lang="de-AT" sz="2000" dirty="0" smtClean="0"/>
-              <a:t> </a:t>
-            </a:r>
-            <a:endParaRPr lang="de-AT" dirty="0"/>
-          </a:p>
-          <a:p>
-            <a:pPr marL="92075" indent="0">
-              <a:buNone/>
-            </a:pPr>
-            <a:endParaRPr lang="de-AT" dirty="0" smtClean="0"/>
-          </a:p>
-          <a:p>
-            <a:pPr marL="92075" indent="0" algn="ctr">
-              <a:buNone/>
-            </a:pPr>
+            <a:br>
+              <a:rPr lang="de-AT" dirty="0" smtClean="0"/>
+            </a:br>
+            <a:r>
+              <a:rPr lang="de-AT" dirty="0" smtClean="0"/>
+              <a:t/>
+            </a:r>
+            <a:br>
+              <a:rPr lang="de-AT" dirty="0" smtClean="0"/>
+            </a:br>
             <a:r>
               <a:rPr lang="de-AT" dirty="0" smtClean="0"/>
               <a:t>…</a:t>

</xml_diff>

<commit_message>
* pulled bugfixes thanks to Manuel Langer (declaration of arrays of polynomial rings) * respective updates to manual slides
</commit_message>
<xml_diff>
--- a/manual (drafts)/Sunset_Slides_UniKlu.pptx
+++ b/manual (drafts)/Sunset_Slides_UniKlu.pptx
@@ -11426,7 +11426,7 @@
           <a:graphicData uri="http://schemas.openxmlformats.org/presentationml/2006/ole">
             <mc:AlternateContent xmlns:mc="http://schemas.openxmlformats.org/markup-compatibility/2006">
               <mc:Choice xmlns:v="urn:schemas-microsoft-com:vml" Requires="v">
-                <p:oleObj spid="_x0000_s2196" name="Visio" r:id="rId3" imgW="4276641" imgH="2038259" progId="Visio.Drawing.15">
+                <p:oleObj spid="_x0000_s2197" name="Visio" r:id="rId3" imgW="4276641" imgH="2038259" progId="Visio.Drawing.15">
                   <p:embed/>
                 </p:oleObj>
               </mc:Choice>
@@ -14312,7 +14312,7 @@
           <a:graphicData uri="http://schemas.openxmlformats.org/presentationml/2006/ole">
             <mc:AlternateContent xmlns:mc="http://schemas.openxmlformats.org/markup-compatibility/2006">
               <mc:Choice xmlns:v="urn:schemas-microsoft-com:vml" Requires="v">
-                <p:oleObj spid="_x0000_s3209" name="Formel" r:id="rId3" imgW="6832600" imgH="749300" progId="Equation.3">
+                <p:oleObj spid="_x0000_s3210" name="Formel" r:id="rId3" imgW="6832600" imgH="749300" progId="Equation.3">
                   <p:embed/>
                 </p:oleObj>
               </mc:Choice>
@@ -15343,7 +15343,7 @@
           <a:graphicData uri="http://schemas.openxmlformats.org/presentationml/2006/ole">
             <mc:AlternateContent xmlns:mc="http://schemas.openxmlformats.org/markup-compatibility/2006">
               <mc:Choice xmlns:v="urn:schemas-microsoft-com:vml" Requires="v">
-                <p:oleObj spid="_x0000_s4232" name="Visio" r:id="rId3" imgW="3202054" imgH="945155" progId="Visio.Drawing.11">
+                <p:oleObj spid="_x0000_s4233" name="Visio" r:id="rId3" imgW="3202054" imgH="945155" progId="Visio.Drawing.11">
                   <p:embed/>
                 </p:oleObj>
               </mc:Choice>
@@ -28738,49 +28738,55 @@
           <a:p>
             <a:r>
               <a:rPr lang="de-AT" dirty="0" err="1" smtClean="0"/>
-              <a:t>Definitions</a:t>
+              <a:t>Comparison</a:t>
             </a:r>
             <a:r>
               <a:rPr lang="de-AT" dirty="0" smtClean="0"/>
-              <a:t> of </a:t>
+              <a:t> </a:t>
             </a:r>
             <a:r>
               <a:rPr lang="de-AT" dirty="0" err="1" smtClean="0"/>
-              <a:t>arrays</a:t>
+              <a:t>to</a:t>
             </a:r>
             <a:r>
               <a:rPr lang="de-AT" dirty="0" smtClean="0"/>
-              <a:t> of type </a:t>
-            </a:r>
-            <a:r>
-              <a:rPr lang="de-AT" sz="1800" b="1" dirty="0">
-                <a:solidFill>
-                  <a:srgbClr val="7030A0"/>
-                </a:solidFill>
-                <a:latin typeface="Courier" pitchFamily="49" charset="0"/>
-                <a:cs typeface="Courier New" panose="02070309020205020404" pitchFamily="49" charset="0"/>
-              </a:rPr>
-              <a:t>Z()[] </a:t>
+              <a:t> </a:t>
             </a:r>
             <a:r>
               <a:rPr lang="de-AT" dirty="0" err="1" smtClean="0"/>
-              <a:t>have</a:t>
+              <a:t>point</a:t>
             </a:r>
             <a:r>
               <a:rPr lang="de-AT" dirty="0" smtClean="0"/>
-              <a:t> </a:t>
+              <a:t> at </a:t>
             </a:r>
             <a:r>
               <a:rPr lang="de-AT" dirty="0" err="1" smtClean="0"/>
-              <a:t>parsing</a:t>
+              <a:t>infinity</a:t>
             </a:r>
             <a:r>
               <a:rPr lang="de-AT" dirty="0" smtClean="0"/>
-              <a:t> </a:t>
+              <a:t> in </a:t>
             </a:r>
             <a:r>
               <a:rPr lang="de-AT" dirty="0" err="1" smtClean="0"/>
-              <a:t>issues</a:t>
+              <a:t>elliptic</a:t>
+            </a:r>
+            <a:r>
+              <a:rPr lang="de-AT" dirty="0" smtClean="0"/>
+              <a:t> </a:t>
+            </a:r>
+            <a:r>
+              <a:rPr lang="de-AT" dirty="0" err="1" smtClean="0"/>
+              <a:t>curves</a:t>
+            </a:r>
+            <a:r>
+              <a:rPr lang="de-AT" dirty="0" smtClean="0"/>
+              <a:t> </a:t>
+            </a:r>
+            <a:r>
+              <a:rPr lang="de-AT" dirty="0" err="1" smtClean="0"/>
+              <a:t>fails</a:t>
             </a:r>
             <a:r>
               <a:rPr lang="de-AT" dirty="0" smtClean="0"/>
@@ -28795,27 +28801,34 @@
               <a:t> </a:t>
             </a:r>
             <a:r>
-              <a:rPr lang="de-AT" dirty="0" err="1" smtClean="0"/>
-              <a:t>the</a:t>
-            </a:r>
-            <a:r>
-              <a:rPr lang="de-AT" dirty="0" smtClean="0"/>
-              <a:t> </a:t>
-            </a:r>
-            <a:r>
-              <a:rPr lang="de-AT" dirty="0" err="1" smtClean="0"/>
-              <a:t>number</a:t>
-            </a:r>
-            <a:r>
-              <a:rPr lang="de-AT" dirty="0" smtClean="0"/>
-              <a:t> of </a:t>
-            </a:r>
-            <a:r>
-              <a:rPr lang="de-AT" dirty="0" err="1" smtClean="0"/>
-              <a:t>elements</a:t>
-            </a:r>
-            <a:r>
-              <a:rPr lang="de-AT" dirty="0" smtClean="0"/>
+              <a:rPr lang="de-AT" sz="1800" dirty="0">
+                <a:latin typeface="Courier New" panose="02070309020205020404" pitchFamily="49" charset="0"/>
+                <a:cs typeface="Courier New" panose="02070309020205020404" pitchFamily="49" charset="0"/>
+              </a:rPr>
+              <a:t>&lt;&lt;</a:t>
+            </a:r>
+            <a:r>
+              <a:rPr lang="de-AT" sz="1800" b="1" dirty="0">
+                <a:solidFill>
+                  <a:srgbClr val="7030A0"/>
+                </a:solidFill>
+                <a:latin typeface="Courier New" panose="02070309020205020404" pitchFamily="49" charset="0"/>
+                <a:cs typeface="Courier New" panose="02070309020205020404" pitchFamily="49" charset="0"/>
+              </a:rPr>
+              <a:t>PAI</a:t>
+            </a:r>
+            <a:r>
+              <a:rPr lang="de-AT" sz="1800" dirty="0" smtClean="0">
+                <a:latin typeface="Courier New" panose="02070309020205020404" pitchFamily="49" charset="0"/>
+                <a:cs typeface="Courier New" panose="02070309020205020404" pitchFamily="49" charset="0"/>
+              </a:rPr>
+              <a:t>&gt;&gt;</a:t>
+            </a:r>
+            <a:r>
+              <a:rPr lang="de-AT" sz="2400" dirty="0" smtClean="0">
+                <a:latin typeface="+mj-lt"/>
+                <a:cs typeface="Courier New" panose="02070309020205020404" pitchFamily="49" charset="0"/>
+              </a:rPr>
               <a:t> </a:t>
             </a:r>
             <a:r>
@@ -28824,11 +28837,11 @@
             </a:r>
             <a:r>
               <a:rPr lang="de-AT" dirty="0" smtClean="0"/>
-              <a:t> not a </a:t>
+              <a:t> </a:t>
             </a:r>
             <a:r>
               <a:rPr lang="de-AT" dirty="0" err="1" smtClean="0"/>
-              <a:t>numeric</a:t>
+              <a:t>used</a:t>
             </a:r>
             <a:r>
               <a:rPr lang="de-AT" dirty="0" smtClean="0"/>
@@ -28836,379 +28849,15 @@
             </a:r>
             <a:r>
               <a:rPr lang="de-AT" dirty="0" err="1" smtClean="0"/>
-              <a:t>token</a:t>
+              <a:t>directly</a:t>
             </a:r>
             <a:r>
               <a:rPr lang="de-AT" dirty="0" smtClean="0"/>
-              <a:t>.</a:t>
-            </a:r>
-            <a:br>
-              <a:rPr lang="de-AT" dirty="0" smtClean="0"/>
-            </a:br>
-            <a:r>
-              <a:rPr lang="de-AT" u="sng" dirty="0" err="1" smtClean="0"/>
-              <a:t>Example</a:t>
-            </a:r>
-            <a:r>
-              <a:rPr lang="de-AT" dirty="0" smtClean="0"/>
-              <a:t>: </a:t>
-            </a:r>
-            <a:br>
-              <a:rPr lang="de-AT" dirty="0" smtClean="0"/>
-            </a:br>
-            <a:r>
-              <a:rPr lang="de-AT" sz="1800" b="1" dirty="0" err="1">
-                <a:solidFill>
-                  <a:srgbClr val="7030A0"/>
-                </a:solidFill>
-                <a:latin typeface="Courier" pitchFamily="49" charset="0"/>
-                <a:cs typeface="Courier New" panose="02070309020205020404" pitchFamily="49" charset="0"/>
-              </a:rPr>
-              <a:t>const</a:t>
-            </a:r>
-            <a:r>
-              <a:rPr lang="de-AT" sz="1800" dirty="0" smtClean="0">
-                <a:latin typeface="Courier" pitchFamily="49" charset="0"/>
-              </a:rPr>
-              <a:t> n: </a:t>
-            </a:r>
-            <a:r>
-              <a:rPr lang="de-AT" sz="1800" b="1" dirty="0">
-                <a:solidFill>
-                  <a:srgbClr val="7030A0"/>
-                </a:solidFill>
-                <a:latin typeface="Courier" pitchFamily="49" charset="0"/>
-                <a:cs typeface="Courier New" panose="02070309020205020404" pitchFamily="49" charset="0"/>
-              </a:rPr>
-              <a:t>Integer</a:t>
-            </a:r>
-            <a:r>
-              <a:rPr lang="de-AT" sz="1800" dirty="0" smtClean="0">
-                <a:latin typeface="Courier" pitchFamily="49" charset="0"/>
-              </a:rPr>
-              <a:t> := 10;</a:t>
-            </a:r>
-            <a:br>
-              <a:rPr lang="de-AT" sz="1800" dirty="0" smtClean="0">
-                <a:latin typeface="Courier" pitchFamily="49" charset="0"/>
-              </a:rPr>
-            </a:br>
-            <a:r>
-              <a:rPr lang="de-AT" sz="1800" dirty="0" smtClean="0">
-                <a:latin typeface="Courier" pitchFamily="49" charset="0"/>
-              </a:rPr>
-              <a:t>A: </a:t>
-            </a:r>
-            <a:r>
-              <a:rPr lang="de-AT" sz="1800" b="1" dirty="0">
-                <a:solidFill>
-                  <a:srgbClr val="7030A0"/>
-                </a:solidFill>
-                <a:latin typeface="Courier" pitchFamily="49" charset="0"/>
-                <a:cs typeface="Courier New" panose="02070309020205020404" pitchFamily="49" charset="0"/>
-              </a:rPr>
-              <a:t>Z</a:t>
-            </a:r>
-            <a:r>
-              <a:rPr lang="de-AT" sz="1800" dirty="0" smtClean="0">
-                <a:latin typeface="Courier" pitchFamily="49" charset="0"/>
-              </a:rPr>
-              <a:t>(13)[]; </a:t>
-            </a:r>
-            <a:r>
-              <a:rPr lang="de-AT" sz="1800" dirty="0">
-                <a:solidFill>
-                  <a:srgbClr val="339933"/>
-                </a:solidFill>
-                <a:latin typeface="Courier New" panose="02070309020205020404" pitchFamily="49" charset="0"/>
-                <a:cs typeface="Courier New" panose="02070309020205020404" pitchFamily="49" charset="0"/>
-              </a:rPr>
-              <a:t>// </a:t>
-            </a:r>
-            <a:r>
-              <a:rPr lang="de-AT" sz="1800" dirty="0" err="1">
-                <a:solidFill>
-                  <a:srgbClr val="339933"/>
-                </a:solidFill>
-                <a:latin typeface="Courier New" panose="02070309020205020404" pitchFamily="49" charset="0"/>
-                <a:cs typeface="Courier New" panose="02070309020205020404" pitchFamily="49" charset="0"/>
-              </a:rPr>
-              <a:t>array</a:t>
-            </a:r>
-            <a:r>
-              <a:rPr lang="de-AT" sz="1800" dirty="0">
-                <a:solidFill>
-                  <a:srgbClr val="339933"/>
-                </a:solidFill>
-                <a:latin typeface="Courier New" panose="02070309020205020404" pitchFamily="49" charset="0"/>
-                <a:cs typeface="Courier New" panose="02070309020205020404" pitchFamily="49" charset="0"/>
-              </a:rPr>
-              <a:t> </a:t>
-            </a:r>
-            <a:r>
-              <a:rPr lang="de-AT" sz="1800" dirty="0" err="1">
-                <a:solidFill>
-                  <a:srgbClr val="339933"/>
-                </a:solidFill>
-                <a:latin typeface="Courier New" panose="02070309020205020404" pitchFamily="49" charset="0"/>
-                <a:cs typeface="Courier New" panose="02070309020205020404" pitchFamily="49" charset="0"/>
-              </a:rPr>
-              <a:t>over</a:t>
-            </a:r>
-            <a:r>
-              <a:rPr lang="de-AT" sz="1800" dirty="0">
-                <a:solidFill>
-                  <a:srgbClr val="339933"/>
-                </a:solidFill>
-                <a:latin typeface="Courier New" panose="02070309020205020404" pitchFamily="49" charset="0"/>
-                <a:cs typeface="Courier New" panose="02070309020205020404" pitchFamily="49" charset="0"/>
-              </a:rPr>
-              <a:t> a </a:t>
-            </a:r>
-            <a:r>
-              <a:rPr lang="de-AT" sz="1800" dirty="0" err="1">
-                <a:solidFill>
-                  <a:srgbClr val="339933"/>
-                </a:solidFill>
-                <a:latin typeface="Courier New" panose="02070309020205020404" pitchFamily="49" charset="0"/>
-                <a:cs typeface="Courier New" panose="02070309020205020404" pitchFamily="49" charset="0"/>
-              </a:rPr>
-              <a:t>polynomial</a:t>
-            </a:r>
-            <a:r>
-              <a:rPr lang="de-AT" sz="1800" dirty="0">
-                <a:solidFill>
-                  <a:srgbClr val="339933"/>
-                </a:solidFill>
-                <a:latin typeface="Courier New" panose="02070309020205020404" pitchFamily="49" charset="0"/>
-                <a:cs typeface="Courier New" panose="02070309020205020404" pitchFamily="49" charset="0"/>
-              </a:rPr>
-              <a:t> ring</a:t>
-            </a:r>
-            <a:r>
-              <a:rPr lang="de-AT" sz="1800" dirty="0" smtClean="0">
-                <a:latin typeface="Courier" pitchFamily="49" charset="0"/>
-              </a:rPr>
-              <a:t/>
-            </a:r>
-            <a:br>
-              <a:rPr lang="de-AT" sz="1800" dirty="0" smtClean="0">
-                <a:latin typeface="Courier" pitchFamily="49" charset="0"/>
-              </a:rPr>
-            </a:br>
-            <a:r>
-              <a:rPr lang="de-AT" sz="1800" dirty="0">
-                <a:solidFill>
-                  <a:srgbClr val="339933"/>
-                </a:solidFill>
-                <a:latin typeface="Courier New" panose="02070309020205020404" pitchFamily="49" charset="0"/>
-                <a:cs typeface="Courier New" panose="02070309020205020404" pitchFamily="49" charset="0"/>
-              </a:rPr>
-              <a:t>// </a:t>
-            </a:r>
-            <a:r>
-              <a:rPr lang="de-AT" sz="1800" dirty="0" err="1">
-                <a:solidFill>
-                  <a:srgbClr val="339933"/>
-                </a:solidFill>
-                <a:latin typeface="Courier New" panose="02070309020205020404" pitchFamily="49" charset="0"/>
-                <a:cs typeface="Courier New" panose="02070309020205020404" pitchFamily="49" charset="0"/>
-              </a:rPr>
-              <a:t>Instantiation</a:t>
-            </a:r>
-            <a:r>
-              <a:rPr lang="de-AT" sz="1800" dirty="0">
-                <a:solidFill>
-                  <a:srgbClr val="339933"/>
-                </a:solidFill>
-                <a:latin typeface="Courier New" panose="02070309020205020404" pitchFamily="49" charset="0"/>
-                <a:cs typeface="Courier New" panose="02070309020205020404" pitchFamily="49" charset="0"/>
-              </a:rPr>
-              <a:t> </a:t>
-            </a:r>
-            <a:r>
-              <a:rPr lang="de-AT" sz="1800" dirty="0" err="1">
-                <a:solidFill>
-                  <a:srgbClr val="339933"/>
-                </a:solidFill>
-                <a:latin typeface="Courier New" panose="02070309020205020404" pitchFamily="49" charset="0"/>
-                <a:cs typeface="Courier New" panose="02070309020205020404" pitchFamily="49" charset="0"/>
-              </a:rPr>
-              <a:t>with</a:t>
-            </a:r>
-            <a:r>
-              <a:rPr lang="de-AT" sz="1800" dirty="0">
-                <a:solidFill>
-                  <a:srgbClr val="339933"/>
-                </a:solidFill>
-                <a:latin typeface="Courier New" panose="02070309020205020404" pitchFamily="49" charset="0"/>
-                <a:cs typeface="Courier New" panose="02070309020205020404" pitchFamily="49" charset="0"/>
-              </a:rPr>
-              <a:t> </a:t>
-            </a:r>
-            <a:r>
-              <a:rPr lang="de-AT" sz="1800" dirty="0" err="1" smtClean="0">
-                <a:solidFill>
-                  <a:srgbClr val="339933"/>
-                </a:solidFill>
-                <a:latin typeface="Courier New" panose="02070309020205020404" pitchFamily="49" charset="0"/>
-                <a:cs typeface="Courier New" panose="02070309020205020404" pitchFamily="49" charset="0"/>
-              </a:rPr>
-              <a:t>new</a:t>
-            </a:r>
-            <a:r>
-              <a:rPr lang="de-AT" sz="1800" dirty="0" smtClean="0">
-                <a:solidFill>
-                  <a:srgbClr val="339933"/>
-                </a:solidFill>
-                <a:latin typeface="Courier New" panose="02070309020205020404" pitchFamily="49" charset="0"/>
-                <a:cs typeface="Courier New" panose="02070309020205020404" pitchFamily="49" charset="0"/>
-              </a:rPr>
-              <a:t> </a:t>
-            </a:r>
-            <a:r>
-              <a:rPr lang="de-AT" sz="1800" dirty="0" err="1" smtClean="0">
-                <a:solidFill>
-                  <a:srgbClr val="339933"/>
-                </a:solidFill>
-                <a:latin typeface="Courier New" panose="02070309020205020404" pitchFamily="49" charset="0"/>
-                <a:cs typeface="Courier New" panose="02070309020205020404" pitchFamily="49" charset="0"/>
-              </a:rPr>
-              <a:t>operator</a:t>
-            </a:r>
-            <a:r>
-              <a:rPr lang="de-AT" sz="1800" dirty="0">
-                <a:solidFill>
-                  <a:srgbClr val="339933"/>
-                </a:solidFill>
-                <a:latin typeface="Courier New" panose="02070309020205020404" pitchFamily="49" charset="0"/>
-                <a:cs typeface="Courier New" panose="02070309020205020404" pitchFamily="49" charset="0"/>
-              </a:rPr>
-              <a:t/>
-            </a:r>
-            <a:br>
-              <a:rPr lang="de-AT" sz="1800" dirty="0">
-                <a:solidFill>
-                  <a:srgbClr val="339933"/>
-                </a:solidFill>
-                <a:latin typeface="Courier New" panose="02070309020205020404" pitchFamily="49" charset="0"/>
-                <a:cs typeface="Courier New" panose="02070309020205020404" pitchFamily="49" charset="0"/>
-              </a:rPr>
-            </a:br>
-            <a:r>
-              <a:rPr lang="de-AT" sz="1800" dirty="0" smtClean="0">
-                <a:latin typeface="Courier" pitchFamily="49" charset="0"/>
-              </a:rPr>
-              <a:t>A := </a:t>
-            </a:r>
-            <a:r>
-              <a:rPr lang="de-AT" sz="1800" b="1" dirty="0" err="1">
-                <a:solidFill>
-                  <a:srgbClr val="7030A0"/>
-                </a:solidFill>
-                <a:latin typeface="Courier" pitchFamily="49" charset="0"/>
-                <a:cs typeface="Courier New" panose="02070309020205020404" pitchFamily="49" charset="0"/>
-              </a:rPr>
-              <a:t>new</a:t>
-            </a:r>
-            <a:r>
-              <a:rPr lang="de-AT" sz="1800" dirty="0" smtClean="0">
-                <a:latin typeface="Courier" pitchFamily="49" charset="0"/>
-              </a:rPr>
-              <a:t> </a:t>
-            </a:r>
-            <a:r>
-              <a:rPr lang="de-AT" sz="1800" b="1" dirty="0">
-                <a:solidFill>
-                  <a:srgbClr val="7030A0"/>
-                </a:solidFill>
-                <a:latin typeface="Courier" pitchFamily="49" charset="0"/>
-                <a:cs typeface="Courier New" panose="02070309020205020404" pitchFamily="49" charset="0"/>
-              </a:rPr>
-              <a:t>Z</a:t>
-            </a:r>
-            <a:r>
-              <a:rPr lang="de-AT" sz="1800" dirty="0" smtClean="0">
-                <a:latin typeface="Courier" pitchFamily="49" charset="0"/>
-              </a:rPr>
-              <a:t>(13)[n] </a:t>
-            </a:r>
-            <a:r>
-              <a:rPr lang="de-AT" sz="1800" dirty="0">
-                <a:solidFill>
-                  <a:srgbClr val="339933"/>
-                </a:solidFill>
-                <a:latin typeface="Courier New" panose="02070309020205020404" pitchFamily="49" charset="0"/>
-                <a:cs typeface="Courier New" panose="02070309020205020404" pitchFamily="49" charset="0"/>
-              </a:rPr>
-              <a:t>// </a:t>
-            </a:r>
-            <a:r>
-              <a:rPr lang="de-AT" sz="1800" dirty="0" err="1">
-                <a:solidFill>
-                  <a:srgbClr val="339933"/>
-                </a:solidFill>
-                <a:latin typeface="Courier New" panose="02070309020205020404" pitchFamily="49" charset="0"/>
-                <a:cs typeface="Courier New" panose="02070309020205020404" pitchFamily="49" charset="0"/>
-              </a:rPr>
-              <a:t>this</a:t>
-            </a:r>
-            <a:r>
-              <a:rPr lang="de-AT" sz="1800" dirty="0">
-                <a:solidFill>
-                  <a:srgbClr val="339933"/>
-                </a:solidFill>
-                <a:latin typeface="Courier New" panose="02070309020205020404" pitchFamily="49" charset="0"/>
-                <a:cs typeface="Courier New" panose="02070309020205020404" pitchFamily="49" charset="0"/>
-              </a:rPr>
-              <a:t> will not parse (BUG</a:t>
-            </a:r>
-            <a:r>
-              <a:rPr lang="de-AT" sz="1800" dirty="0" smtClean="0">
-                <a:solidFill>
-                  <a:srgbClr val="339933"/>
-                </a:solidFill>
-                <a:latin typeface="Courier New" panose="02070309020205020404" pitchFamily="49" charset="0"/>
-                <a:cs typeface="Courier New" panose="02070309020205020404" pitchFamily="49" charset="0"/>
-              </a:rPr>
-              <a:t>)</a:t>
-            </a:r>
-            <a:br>
-              <a:rPr lang="de-AT" sz="1800" dirty="0" smtClean="0">
-                <a:solidFill>
-                  <a:srgbClr val="339933"/>
-                </a:solidFill>
-                <a:latin typeface="Courier New" panose="02070309020205020404" pitchFamily="49" charset="0"/>
-                <a:cs typeface="Courier New" panose="02070309020205020404" pitchFamily="49" charset="0"/>
-              </a:rPr>
-            </a:br>
-            <a:r>
-              <a:rPr lang="de-AT" u="sng" dirty="0"/>
-              <a:t>Workaround</a:t>
-            </a:r>
-            <a:r>
-              <a:rPr lang="de-AT" dirty="0" smtClean="0"/>
-              <a:t>: </a:t>
+              <a:t> </a:t>
             </a:r>
             <a:r>
               <a:rPr lang="de-AT" dirty="0" err="1" smtClean="0"/>
-              <a:t>first</a:t>
-            </a:r>
-            <a:r>
-              <a:rPr lang="de-AT" dirty="0" smtClean="0"/>
-              <a:t> </a:t>
-            </a:r>
-            <a:r>
-              <a:rPr lang="de-AT" dirty="0" err="1" smtClean="0"/>
-              <a:t>token</a:t>
-            </a:r>
-            <a:r>
-              <a:rPr lang="de-AT" dirty="0" smtClean="0"/>
-              <a:t> must </a:t>
-            </a:r>
-            <a:r>
-              <a:rPr lang="de-AT" dirty="0" err="1" smtClean="0"/>
-              <a:t>be</a:t>
+              <a:t>as</a:t>
             </a:r>
             <a:r>
               <a:rPr lang="de-AT" dirty="0" smtClean="0"/>
@@ -29216,153 +28865,498 @@
             </a:r>
             <a:r>
               <a:rPr lang="de-AT" dirty="0" err="1" smtClean="0"/>
-              <a:t>number</a:t>
+              <a:t>literal</a:t>
             </a:r>
             <a:r>
               <a:rPr lang="de-AT" dirty="0" smtClean="0"/>
-              <a:t>; </a:t>
-            </a:r>
-            <a:r>
-              <a:rPr lang="de-AT" dirty="0" err="1" smtClean="0"/>
-              <a:t>add</a:t>
-            </a:r>
+              <a:t>:</a:t>
+            </a:r>
+          </a:p>
+          <a:p>
+            <a:pPr lvl="1"/>
+            <a:r>
+              <a:rPr lang="de-AT" sz="1600" b="1" dirty="0" err="1">
+                <a:solidFill>
+                  <a:srgbClr val="7030A0"/>
+                </a:solidFill>
+                <a:latin typeface="Courier New" panose="02070309020205020404" pitchFamily="49" charset="0"/>
+                <a:ea typeface="+mn-ea"/>
+                <a:cs typeface="Courier New" panose="02070309020205020404" pitchFamily="49" charset="0"/>
+              </a:rPr>
+              <a:t>if</a:t>
+            </a:r>
+            <a:r>
+              <a:rPr lang="de-AT" sz="1400" dirty="0" smtClean="0">
+                <a:solidFill>
+                  <a:srgbClr val="339933"/>
+                </a:solidFill>
+                <a:latin typeface="Courier New" panose="02070309020205020404" pitchFamily="49" charset="0"/>
+                <a:cs typeface="Courier New" panose="02070309020205020404" pitchFamily="49" charset="0"/>
+              </a:rPr>
+              <a:t> </a:t>
+            </a:r>
+            <a:r>
+              <a:rPr lang="de-AT" sz="1400" dirty="0" smtClean="0">
+                <a:latin typeface="Courier New" panose="02070309020205020404" pitchFamily="49" charset="0"/>
+                <a:cs typeface="Courier New" panose="02070309020205020404" pitchFamily="49" charset="0"/>
+              </a:rPr>
+              <a:t>(P == &lt;&lt;</a:t>
+            </a:r>
+            <a:r>
+              <a:rPr lang="de-AT" sz="1600" b="1" dirty="0">
+                <a:solidFill>
+                  <a:srgbClr val="7030A0"/>
+                </a:solidFill>
+                <a:latin typeface="Courier New" panose="02070309020205020404" pitchFamily="49" charset="0"/>
+                <a:ea typeface="+mn-ea"/>
+                <a:cs typeface="Courier New" panose="02070309020205020404" pitchFamily="49" charset="0"/>
+              </a:rPr>
+              <a:t>PAI</a:t>
+            </a:r>
+            <a:r>
+              <a:rPr lang="de-AT" sz="1400" dirty="0" smtClean="0">
+                <a:latin typeface="Courier New" panose="02070309020205020404" pitchFamily="49" charset="0"/>
+                <a:cs typeface="Courier New" panose="02070309020205020404" pitchFamily="49" charset="0"/>
+              </a:rPr>
+              <a:t>&gt;&gt;)  </a:t>
+            </a:r>
+            <a:r>
+              <a:rPr lang="de-AT" sz="1400" dirty="0" smtClean="0">
+                <a:solidFill>
+                  <a:srgbClr val="339933"/>
+                </a:solidFill>
+                <a:latin typeface="Courier New" panose="02070309020205020404" pitchFamily="49" charset="0"/>
+                <a:cs typeface="Courier New" panose="02070309020205020404" pitchFamily="49" charset="0"/>
+              </a:rPr>
+              <a:t>// </a:t>
+            </a:r>
+            <a:r>
+              <a:rPr lang="de-AT" sz="1400" dirty="0" err="1" smtClean="0">
+                <a:solidFill>
+                  <a:srgbClr val="339933"/>
+                </a:solidFill>
+                <a:latin typeface="Courier New" panose="02070309020205020404" pitchFamily="49" charset="0"/>
+                <a:cs typeface="Courier New" panose="02070309020205020404" pitchFamily="49" charset="0"/>
+              </a:rPr>
+              <a:t>this</a:t>
+            </a:r>
+            <a:r>
+              <a:rPr lang="de-AT" sz="1400" dirty="0" smtClean="0">
+                <a:solidFill>
+                  <a:srgbClr val="339933"/>
+                </a:solidFill>
+                <a:latin typeface="Courier New" panose="02070309020205020404" pitchFamily="49" charset="0"/>
+                <a:cs typeface="Courier New" panose="02070309020205020404" pitchFamily="49" charset="0"/>
+              </a:rPr>
+              <a:t> </a:t>
+            </a:r>
+            <a:r>
+              <a:rPr lang="de-AT" sz="1400" dirty="0" err="1" smtClean="0">
+                <a:solidFill>
+                  <a:srgbClr val="339933"/>
+                </a:solidFill>
+                <a:latin typeface="Courier New" panose="02070309020205020404" pitchFamily="49" charset="0"/>
+                <a:cs typeface="Courier New" panose="02070309020205020404" pitchFamily="49" charset="0"/>
+              </a:rPr>
+              <a:t>fails</a:t>
+            </a:r>
+            <a:r>
+              <a:rPr lang="de-AT" sz="1400" dirty="0" smtClean="0">
+                <a:solidFill>
+                  <a:srgbClr val="339933"/>
+                </a:solidFill>
+                <a:latin typeface="Courier New" panose="02070309020205020404" pitchFamily="49" charset="0"/>
+                <a:cs typeface="Courier New" panose="02070309020205020404" pitchFamily="49" charset="0"/>
+              </a:rPr>
+              <a:t> (</a:t>
+            </a:r>
+            <a:r>
+              <a:rPr lang="de-AT" sz="1400" dirty="0" err="1" smtClean="0">
+                <a:solidFill>
+                  <a:srgbClr val="339933"/>
+                </a:solidFill>
+                <a:latin typeface="Courier New" panose="02070309020205020404" pitchFamily="49" charset="0"/>
+                <a:cs typeface="Courier New" panose="02070309020205020404" pitchFamily="49" charset="0"/>
+              </a:rPr>
+              <a:t>without</a:t>
+            </a:r>
+            <a:r>
+              <a:rPr lang="de-AT" sz="1400" dirty="0" smtClean="0">
+                <a:solidFill>
+                  <a:srgbClr val="339933"/>
+                </a:solidFill>
+                <a:latin typeface="Courier New" panose="02070309020205020404" pitchFamily="49" charset="0"/>
+                <a:cs typeface="Courier New" panose="02070309020205020404" pitchFamily="49" charset="0"/>
+              </a:rPr>
+              <a:t> </a:t>
+            </a:r>
+            <a:r>
+              <a:rPr lang="de-AT" sz="1400" dirty="0" err="1" smtClean="0">
+                <a:solidFill>
+                  <a:srgbClr val="339933"/>
+                </a:solidFill>
+                <a:latin typeface="Courier New" panose="02070309020205020404" pitchFamily="49" charset="0"/>
+                <a:cs typeface="Courier New" panose="02070309020205020404" pitchFamily="49" charset="0"/>
+              </a:rPr>
+              <a:t>error</a:t>
+            </a:r>
+            <a:r>
+              <a:rPr lang="de-AT" sz="1400" dirty="0" smtClean="0">
+                <a:solidFill>
+                  <a:srgbClr val="339933"/>
+                </a:solidFill>
+                <a:latin typeface="Courier New" panose="02070309020205020404" pitchFamily="49" charset="0"/>
+                <a:cs typeface="Courier New" panose="02070309020205020404" pitchFamily="49" charset="0"/>
+              </a:rPr>
+              <a:t> </a:t>
+            </a:r>
+            <a:r>
+              <a:rPr lang="de-AT" sz="1400" dirty="0" err="1" smtClean="0">
+                <a:solidFill>
+                  <a:srgbClr val="339933"/>
+                </a:solidFill>
+                <a:latin typeface="Courier New" panose="02070309020205020404" pitchFamily="49" charset="0"/>
+                <a:cs typeface="Courier New" panose="02070309020205020404" pitchFamily="49" charset="0"/>
+              </a:rPr>
+              <a:t>msg</a:t>
+            </a:r>
+            <a:r>
+              <a:rPr lang="de-AT" sz="1400" dirty="0" smtClean="0">
+                <a:solidFill>
+                  <a:srgbClr val="339933"/>
+                </a:solidFill>
+                <a:latin typeface="Courier New" panose="02070309020205020404" pitchFamily="49" charset="0"/>
+                <a:cs typeface="Courier New" panose="02070309020205020404" pitchFamily="49" charset="0"/>
+              </a:rPr>
+              <a:t>; internal </a:t>
+            </a:r>
+            <a:r>
+              <a:rPr lang="de-AT" sz="1400" dirty="0" err="1" smtClean="0">
+                <a:solidFill>
+                  <a:srgbClr val="339933"/>
+                </a:solidFill>
+                <a:latin typeface="Courier New" panose="02070309020205020404" pitchFamily="49" charset="0"/>
+                <a:cs typeface="Courier New" panose="02070309020205020404" pitchFamily="49" charset="0"/>
+              </a:rPr>
+              <a:t>exception</a:t>
+            </a:r>
+            <a:r>
+              <a:rPr lang="de-AT" sz="1400" dirty="0" smtClean="0">
+                <a:solidFill>
+                  <a:srgbClr val="339933"/>
+                </a:solidFill>
+                <a:latin typeface="Courier New" panose="02070309020205020404" pitchFamily="49" charset="0"/>
+                <a:cs typeface="Courier New" panose="02070309020205020404" pitchFamily="49" charset="0"/>
+              </a:rPr>
+              <a:t>)</a:t>
+            </a:r>
+          </a:p>
+          <a:p>
+            <a:pPr lvl="1"/>
             <a:r>
               <a:rPr lang="de-AT" dirty="0" smtClean="0"/>
-              <a:t> </a:t>
-            </a:r>
-            <a:r>
-              <a:rPr lang="de-AT" dirty="0" err="1" smtClean="0"/>
-              <a:t>zero</a:t>
-            </a:r>
-            <a:r>
-              <a:rPr lang="de-AT" dirty="0" smtClean="0"/>
-              <a:t>: </a:t>
-            </a:r>
-            <a:r>
-              <a:rPr lang="de-AT" sz="2000" dirty="0" smtClean="0">
-                <a:latin typeface="Courier" pitchFamily="49" charset="0"/>
-              </a:rPr>
-              <a:t>0+…</a:t>
-            </a:r>
-            <a:r>
-              <a:rPr lang="de-AT" sz="1800" dirty="0">
+              <a:t>Workaround: </a:t>
+            </a:r>
+            <a:r>
+              <a:rPr lang="de-AT" dirty="0" err="1">
+                <a:solidFill>
+                  <a:srgbClr val="0000FF"/>
+                </a:solidFill>
+              </a:rPr>
+              <a:t>use</a:t>
+            </a:r>
+            <a:r>
+              <a:rPr lang="de-AT" dirty="0">
+                <a:solidFill>
+                  <a:srgbClr val="0000FF"/>
+                </a:solidFill>
+              </a:rPr>
+              <a:t> a variable </a:t>
+            </a:r>
+            <a:r>
+              <a:rPr lang="de-AT" dirty="0"/>
+              <a:t>of </a:t>
+            </a:r>
+            <a:r>
+              <a:rPr lang="de-AT" dirty="0" err="1"/>
+              <a:t>the</a:t>
+            </a:r>
+            <a:r>
+              <a:rPr lang="de-AT" dirty="0"/>
+              <a:t> same type </a:t>
+            </a:r>
+            <a:r>
+              <a:rPr lang="de-AT" dirty="0" err="1"/>
+              <a:t>as</a:t>
+            </a:r>
+            <a:r>
+              <a:rPr lang="de-AT" dirty="0"/>
+              <a:t> </a:t>
+            </a:r>
+            <a:r>
+              <a:rPr lang="de-AT" sz="2000" dirty="0">
+                <a:latin typeface="Courier New" panose="02070309020205020404" pitchFamily="49" charset="0"/>
+                <a:cs typeface="Courier New" panose="02070309020205020404" pitchFamily="49" charset="0"/>
+              </a:rPr>
+              <a:t>P</a:t>
+            </a:r>
+            <a:r>
+              <a:rPr lang="de-AT" dirty="0"/>
+              <a:t> </a:t>
+            </a:r>
+            <a:r>
+              <a:rPr lang="de-AT" dirty="0" err="1"/>
+              <a:t>and</a:t>
+            </a:r>
+            <a:r>
+              <a:rPr lang="de-AT" dirty="0"/>
+              <a:t> </a:t>
+            </a:r>
+            <a:r>
+              <a:rPr lang="de-AT" dirty="0" err="1">
+                <a:solidFill>
+                  <a:srgbClr val="0000FF"/>
+                </a:solidFill>
+              </a:rPr>
+              <a:t>assign</a:t>
+            </a:r>
+            <a:r>
+              <a:rPr lang="de-AT" dirty="0">
+                <a:solidFill>
+                  <a:srgbClr val="0000FF"/>
+                </a:solidFill>
+              </a:rPr>
+              <a:t> </a:t>
+            </a:r>
+            <a:r>
+              <a:rPr lang="de-AT" dirty="0" err="1">
+                <a:solidFill>
+                  <a:srgbClr val="0000FF"/>
+                </a:solidFill>
+              </a:rPr>
+              <a:t>it</a:t>
+            </a:r>
+            <a:r>
+              <a:rPr lang="de-AT" dirty="0">
+                <a:solidFill>
+                  <a:srgbClr val="0000FF"/>
+                </a:solidFill>
+              </a:rPr>
+              <a:t> </a:t>
+            </a:r>
+            <a:r>
+              <a:rPr lang="de-AT" dirty="0" err="1">
+                <a:solidFill>
+                  <a:srgbClr val="0000FF"/>
+                </a:solidFill>
+              </a:rPr>
+              <a:t>the</a:t>
+            </a:r>
+            <a:r>
+              <a:rPr lang="de-AT" dirty="0">
+                <a:solidFill>
+                  <a:srgbClr val="0000FF"/>
+                </a:solidFill>
+              </a:rPr>
+              <a:t> </a:t>
+            </a:r>
+            <a:r>
+              <a:rPr lang="de-AT" dirty="0" err="1">
+                <a:solidFill>
+                  <a:srgbClr val="0000FF"/>
+                </a:solidFill>
+              </a:rPr>
+              <a:t>point</a:t>
+            </a:r>
+            <a:r>
+              <a:rPr lang="de-AT" dirty="0">
+                <a:solidFill>
+                  <a:srgbClr val="0000FF"/>
+                </a:solidFill>
+              </a:rPr>
+              <a:t> at </a:t>
+            </a:r>
+            <a:r>
+              <a:rPr lang="de-AT" dirty="0" err="1">
+                <a:solidFill>
+                  <a:srgbClr val="0000FF"/>
+                </a:solidFill>
+              </a:rPr>
+              <a:t>infinity</a:t>
+            </a:r>
+            <a:r>
+              <a:rPr lang="de-AT" dirty="0">
+                <a:solidFill>
+                  <a:srgbClr val="0000FF"/>
+                </a:solidFill>
+              </a:rPr>
+              <a:t> </a:t>
+            </a:r>
+            <a:r>
+              <a:rPr lang="de-AT" dirty="0" err="1">
+                <a:solidFill>
+                  <a:srgbClr val="0000FF"/>
+                </a:solidFill>
+              </a:rPr>
+              <a:t>as</a:t>
+            </a:r>
+            <a:r>
+              <a:rPr lang="de-AT" dirty="0">
+                <a:solidFill>
+                  <a:srgbClr val="0000FF"/>
+                </a:solidFill>
+              </a:rPr>
+              <a:t> a </a:t>
+            </a:r>
+            <a:r>
+              <a:rPr lang="de-AT" dirty="0" err="1">
+                <a:solidFill>
+                  <a:srgbClr val="0000FF"/>
+                </a:solidFill>
+              </a:rPr>
+              <a:t>value</a:t>
+            </a:r>
+            <a:r>
+              <a:rPr lang="de-AT" dirty="0"/>
+              <a:t>:</a:t>
+            </a:r>
+            <a:br>
+              <a:rPr lang="de-AT" dirty="0"/>
+            </a:br>
+            <a:r>
+              <a:rPr lang="de-AT" sz="1400" dirty="0" err="1" smtClean="0">
+                <a:latin typeface="Courier New" panose="02070309020205020404" pitchFamily="49" charset="0"/>
+                <a:cs typeface="Courier New" panose="02070309020205020404" pitchFamily="49" charset="0"/>
+              </a:rPr>
+              <a:t>neutral_element</a:t>
+            </a:r>
+            <a:r>
+              <a:rPr lang="de-AT" sz="1400" dirty="0" smtClean="0">
+                <a:latin typeface="Courier New" panose="02070309020205020404" pitchFamily="49" charset="0"/>
+                <a:cs typeface="Courier New" panose="02070309020205020404" pitchFamily="49" charset="0"/>
+              </a:rPr>
+              <a:t> := &lt;&lt;</a:t>
+            </a:r>
+            <a:r>
+              <a:rPr lang="de-AT" sz="1600" b="1">
+                <a:solidFill>
+                  <a:srgbClr val="7030A0"/>
+                </a:solidFill>
+                <a:latin typeface="Courier New" panose="02070309020205020404" pitchFamily="49" charset="0"/>
+                <a:ea typeface="+mn-ea"/>
+                <a:cs typeface="Courier New" panose="02070309020205020404" pitchFamily="49" charset="0"/>
+              </a:rPr>
+              <a:t>PAI</a:t>
+            </a:r>
+            <a:r>
+              <a:rPr lang="de-AT" sz="1400" smtClean="0">
+                <a:latin typeface="Courier New" panose="02070309020205020404" pitchFamily="49" charset="0"/>
+                <a:cs typeface="Courier New" panose="02070309020205020404" pitchFamily="49" charset="0"/>
+              </a:rPr>
+              <a:t>&gt;&gt;;</a:t>
+            </a:r>
+            <a:r>
+              <a:rPr lang="de-AT" sz="1400" dirty="0" smtClean="0">
+                <a:latin typeface="Courier New" panose="02070309020205020404" pitchFamily="49" charset="0"/>
+                <a:cs typeface="Courier New" panose="02070309020205020404" pitchFamily="49" charset="0"/>
+              </a:rPr>
+              <a:t/>
+            </a:r>
+            <a:br>
+              <a:rPr lang="de-AT" sz="1400" dirty="0" smtClean="0">
+                <a:latin typeface="Courier New" panose="02070309020205020404" pitchFamily="49" charset="0"/>
+                <a:cs typeface="Courier New" panose="02070309020205020404" pitchFamily="49" charset="0"/>
+              </a:rPr>
+            </a:br>
+            <a:r>
+              <a:rPr lang="de-AT" sz="1600" b="1" dirty="0" err="1">
+                <a:solidFill>
+                  <a:srgbClr val="7030A0"/>
+                </a:solidFill>
+                <a:latin typeface="Courier New" panose="02070309020205020404" pitchFamily="49" charset="0"/>
+                <a:ea typeface="+mn-ea"/>
+                <a:cs typeface="Courier New" panose="02070309020205020404" pitchFamily="49" charset="0"/>
+              </a:rPr>
+              <a:t>if</a:t>
+            </a:r>
+            <a:r>
+              <a:rPr lang="de-AT" sz="1400" dirty="0" smtClean="0">
                 <a:solidFill>
                   <a:srgbClr val="339933"/>
                 </a:solidFill>
                 <a:latin typeface="Courier New" panose="02070309020205020404" pitchFamily="49" charset="0"/>
                 <a:cs typeface="Courier New" panose="02070309020205020404" pitchFamily="49" charset="0"/>
               </a:rPr>
-              <a:t/>
-            </a:r>
-            <a:br>
-              <a:rPr lang="de-AT" sz="1800" dirty="0">
+              <a:t> </a:t>
+            </a:r>
+            <a:r>
+              <a:rPr lang="de-AT" sz="1400" dirty="0" smtClean="0">
+                <a:latin typeface="Courier New" panose="02070309020205020404" pitchFamily="49" charset="0"/>
+                <a:cs typeface="Courier New" panose="02070309020205020404" pitchFamily="49" charset="0"/>
+              </a:rPr>
+              <a:t>(P == </a:t>
+            </a:r>
+            <a:r>
+              <a:rPr lang="de-AT" sz="1400" dirty="0" err="1" smtClean="0">
+                <a:latin typeface="Courier New" panose="02070309020205020404" pitchFamily="49" charset="0"/>
+                <a:cs typeface="Courier New" panose="02070309020205020404" pitchFamily="49" charset="0"/>
+              </a:rPr>
+              <a:t>neutral_element</a:t>
+            </a:r>
+            <a:r>
+              <a:rPr lang="de-AT" sz="1400" dirty="0" smtClean="0">
+                <a:latin typeface="Courier New" panose="02070309020205020404" pitchFamily="49" charset="0"/>
+                <a:cs typeface="Courier New" panose="02070309020205020404" pitchFamily="49" charset="0"/>
+              </a:rPr>
+              <a:t>) </a:t>
+            </a:r>
+            <a:r>
+              <a:rPr lang="de-AT" sz="1400" dirty="0" smtClean="0">
                 <a:solidFill>
                   <a:srgbClr val="339933"/>
                 </a:solidFill>
                 <a:latin typeface="Courier New" panose="02070309020205020404" pitchFamily="49" charset="0"/>
                 <a:cs typeface="Courier New" panose="02070309020205020404" pitchFamily="49" charset="0"/>
               </a:rPr>
-            </a:br>
-            <a:r>
-              <a:rPr lang="de-AT" sz="1800" dirty="0">
-                <a:latin typeface="Courier" pitchFamily="49" charset="0"/>
-              </a:rPr>
-              <a:t>A := </a:t>
-            </a:r>
-            <a:r>
-              <a:rPr lang="de-AT" sz="1800" b="1" dirty="0" err="1">
-                <a:solidFill>
-                  <a:srgbClr val="7030A0"/>
-                </a:solidFill>
-                <a:latin typeface="Courier" pitchFamily="49" charset="0"/>
-                <a:cs typeface="Courier New" panose="02070309020205020404" pitchFamily="49" charset="0"/>
-              </a:rPr>
-              <a:t>new</a:t>
-            </a:r>
-            <a:r>
-              <a:rPr lang="de-AT" sz="1800" dirty="0">
-                <a:latin typeface="Courier" pitchFamily="49" charset="0"/>
-              </a:rPr>
-              <a:t> </a:t>
-            </a:r>
-            <a:r>
-              <a:rPr lang="de-AT" sz="1800" b="1" dirty="0">
-                <a:solidFill>
-                  <a:srgbClr val="7030A0"/>
-                </a:solidFill>
-                <a:latin typeface="Courier" pitchFamily="49" charset="0"/>
-                <a:cs typeface="Courier New" panose="02070309020205020404" pitchFamily="49" charset="0"/>
-              </a:rPr>
-              <a:t>Z</a:t>
-            </a:r>
-            <a:r>
-              <a:rPr lang="de-AT" sz="1800" dirty="0">
-                <a:latin typeface="Courier" pitchFamily="49" charset="0"/>
-              </a:rPr>
-              <a:t>(13</a:t>
-            </a:r>
-            <a:r>
-              <a:rPr lang="de-AT" sz="1800" dirty="0" smtClean="0">
-                <a:latin typeface="Courier" pitchFamily="49" charset="0"/>
-              </a:rPr>
-              <a:t>)[0+n</a:t>
-            </a:r>
-            <a:r>
-              <a:rPr lang="de-AT" sz="1800" dirty="0">
-                <a:latin typeface="Courier" pitchFamily="49" charset="0"/>
-              </a:rPr>
-              <a:t>] </a:t>
-            </a:r>
-            <a:r>
-              <a:rPr lang="de-AT" sz="1800" dirty="0">
+              <a:t>// </a:t>
+            </a:r>
+            <a:r>
+              <a:rPr lang="de-AT" sz="1400" dirty="0" err="1" smtClean="0">
                 <a:solidFill>
                   <a:srgbClr val="339933"/>
                 </a:solidFill>
                 <a:latin typeface="Courier New" panose="02070309020205020404" pitchFamily="49" charset="0"/>
                 <a:cs typeface="Courier New" panose="02070309020205020404" pitchFamily="49" charset="0"/>
               </a:rPr>
-              <a:t>// </a:t>
-            </a:r>
-            <a:r>
-              <a:rPr lang="de-AT" sz="1800" dirty="0" err="1">
+              <a:t>this</a:t>
+            </a:r>
+            <a:r>
+              <a:rPr lang="de-AT" sz="1400" dirty="0" smtClean="0">
                 <a:solidFill>
                   <a:srgbClr val="339933"/>
                 </a:solidFill>
                 <a:latin typeface="Courier New" panose="02070309020205020404" pitchFamily="49" charset="0"/>
                 <a:cs typeface="Courier New" panose="02070309020205020404" pitchFamily="49" charset="0"/>
               </a:rPr>
-              <a:t>this</a:t>
-            </a:r>
-            <a:r>
-              <a:rPr lang="de-AT" sz="1800" dirty="0">
+              <a:t> </a:t>
+            </a:r>
+            <a:r>
+              <a:rPr lang="de-AT" sz="1400" dirty="0" err="1" smtClean="0">
                 <a:solidFill>
                   <a:srgbClr val="339933"/>
                 </a:solidFill>
                 <a:latin typeface="Courier New" panose="02070309020205020404" pitchFamily="49" charset="0"/>
                 <a:cs typeface="Courier New" panose="02070309020205020404" pitchFamily="49" charset="0"/>
               </a:rPr>
-              <a:t> will </a:t>
-            </a:r>
-            <a:r>
-              <a:rPr lang="de-AT" sz="1800" dirty="0" err="1" smtClean="0">
-                <a:solidFill>
-                  <a:srgbClr val="339933"/>
-                </a:solidFill>
-                <a:latin typeface="Courier New" panose="02070309020205020404" pitchFamily="49" charset="0"/>
-                <a:cs typeface="Courier New" panose="02070309020205020404" pitchFamily="49" charset="0"/>
-              </a:rPr>
-              <a:t>work</a:t>
-            </a:r>
-            <a:r>
-              <a:rPr lang="de-AT" sz="1800" dirty="0" smtClean="0">
-                <a:solidFill>
-                  <a:srgbClr val="339933"/>
-                </a:solidFill>
-                <a:latin typeface="Courier New" panose="02070309020205020404" pitchFamily="49" charset="0"/>
-                <a:cs typeface="Courier New" panose="02070309020205020404" pitchFamily="49" charset="0"/>
-              </a:rPr>
-              <a:t> (but not „[n+0]“!)</a:t>
-            </a:r>
+              <a:t>works</a:t>
+            </a:r>
+            <a:endParaRPr lang="de-AT" sz="1400" dirty="0" smtClean="0">
+              <a:solidFill>
+                <a:srgbClr val="339933"/>
+              </a:solidFill>
+              <a:latin typeface="Courier New" panose="02070309020205020404" pitchFamily="49" charset="0"/>
+              <a:cs typeface="Courier New" panose="02070309020205020404" pitchFamily="49" charset="0"/>
+            </a:endParaRPr>
           </a:p>
           <a:p>
             <a:r>

</xml_diff>